<commit_message>
Final Presentation - added bugs section
</commit_message>
<xml_diff>
--- a/misc/ppt/Final Presentation.pptx
+++ b/misc/ppt/Final Presentation.pptx
@@ -5,7 +5,7 @@
     <p:sldMasterId id="2147483648" r:id="rId1"/>
   </p:sldMasterIdLst>
   <p:notesMasterIdLst>
-    <p:notesMasterId r:id="rId24"/>
+    <p:notesMasterId r:id="rId28"/>
   </p:notesMasterIdLst>
   <p:sldIdLst>
     <p:sldId id="256" r:id="rId2"/>
@@ -30,6 +30,10 @@
     <p:sldId id="286" r:id="rId21"/>
     <p:sldId id="287" r:id="rId22"/>
     <p:sldId id="289" r:id="rId23"/>
+    <p:sldId id="290" r:id="rId24"/>
+    <p:sldId id="291" r:id="rId25"/>
+    <p:sldId id="292" r:id="rId26"/>
+    <p:sldId id="293" r:id="rId27"/>
   </p:sldIdLst>
   <p:sldSz cx="12192000" cy="6858000"/>
   <p:notesSz cx="6858000" cy="9144000"/>
@@ -155,6 +159,10 @@
             <p14:sldId id="286"/>
             <p14:sldId id="287"/>
             <p14:sldId id="289"/>
+            <p14:sldId id="290"/>
+            <p14:sldId id="291"/>
+            <p14:sldId id="292"/>
+            <p14:sldId id="293"/>
           </p14:sldIdLst>
         </p14:section>
       </p14:sectionLst>
@@ -1077,30 +1085,6 @@
           <a:lstStyle/>
           <a:p>
             <a:pPr algn="r" rtl="1"/>
-            <a:r>
-              <a:rPr lang="he-IL" dirty="0" smtClean="0"/>
-              <a:t>ככל הנראה הפונקציה</a:t>
-            </a:r>
-            <a:r>
-              <a:rPr lang="he-IL" baseline="0" dirty="0" smtClean="0"/>
-              <a:t> הפנימית התחתונה נמחקת מה-</a:t>
-            </a:r>
-            <a:r>
-              <a:rPr lang="en-US" baseline="0" dirty="0" smtClean="0"/>
-              <a:t>scope</a:t>
-            </a:r>
-            <a:r>
-              <a:rPr lang="he-IL" baseline="0" dirty="0" smtClean="0"/>
-              <a:t> הגלובלי באופטימיזציה, וכתוצאה מכך </a:t>
-            </a:r>
-            <a:r>
-              <a:rPr lang="en-US" baseline="0" dirty="0" smtClean="0"/>
-              <a:t>print</a:t>
-            </a:r>
-            <a:r>
-              <a:rPr lang="he-IL" baseline="0" dirty="0" smtClean="0"/>
-              <a:t> אינה מוגדרת יותר.</a:t>
-            </a:r>
             <a:endParaRPr lang="en-US" dirty="0"/>
           </a:p>
         </p:txBody>
@@ -1132,6 +1116,425 @@
     <p:extLst>
       <p:ext uri="{BB962C8B-B14F-4D97-AF65-F5344CB8AC3E}">
         <p14:creationId xmlns:p14="http://schemas.microsoft.com/office/powerpoint/2010/main" val="357771464"/>
+      </p:ext>
+    </p:extLst>
+  </p:cSld>
+  <p:clrMapOvr>
+    <a:masterClrMapping/>
+  </p:clrMapOvr>
+</p:notes>
+</file>
+
+<file path=ppt/notesSlides/notesSlide15.xml><?xml version="1.0" encoding="utf-8"?>
+<p:notes xmlns:a="http://schemas.openxmlformats.org/drawingml/2006/main" xmlns:r="http://schemas.openxmlformats.org/officeDocument/2006/relationships" xmlns:p="http://schemas.openxmlformats.org/presentationml/2006/main">
+  <p:cSld>
+    <p:spTree>
+      <p:nvGrpSpPr>
+        <p:cNvPr id="1" name=""/>
+        <p:cNvGrpSpPr/>
+        <p:nvPr/>
+      </p:nvGrpSpPr>
+      <p:grpSpPr>
+        <a:xfrm>
+          <a:off x="0" y="0"/>
+          <a:ext cx="0" cy="0"/>
+          <a:chOff x="0" y="0"/>
+          <a:chExt cx="0" cy="0"/>
+        </a:xfrm>
+      </p:grpSpPr>
+      <p:sp>
+        <p:nvSpPr>
+          <p:cNvPr id="2" name="מציין מיקום של תמונת שקופית 1"/>
+          <p:cNvSpPr>
+            <a:spLocks noGrp="1" noRot="1" noChangeAspect="1"/>
+          </p:cNvSpPr>
+          <p:nvPr>
+            <p:ph type="sldImg"/>
+          </p:nvPr>
+        </p:nvSpPr>
+        <p:spPr/>
+      </p:sp>
+      <p:sp>
+        <p:nvSpPr>
+          <p:cNvPr id="3" name="מציין מיקום של הערות 2"/>
+          <p:cNvSpPr>
+            <a:spLocks noGrp="1"/>
+          </p:cNvSpPr>
+          <p:nvPr>
+            <p:ph type="body" idx="1"/>
+          </p:nvPr>
+        </p:nvSpPr>
+        <p:spPr/>
+        <p:txBody>
+          <a:bodyPr/>
+          <a:lstStyle/>
+          <a:p>
+            <a:pPr algn="r" rtl="1"/>
+            <a:r>
+              <a:rPr lang="he-IL" dirty="0" smtClean="0"/>
+              <a:t>למרות</a:t>
+            </a:r>
+            <a:r>
+              <a:rPr lang="he-IL" baseline="0" dirty="0" smtClean="0"/>
+              <a:t> שהפונקציה מוגדרת ב</a:t>
+            </a:r>
+            <a:r>
+              <a:rPr lang="en-US" baseline="0" dirty="0" smtClean="0"/>
+              <a:t>flow</a:t>
+            </a:r>
+            <a:r>
+              <a:rPr lang="he-IL" baseline="0" dirty="0" smtClean="0"/>
+              <a:t> שמגיעים אליו, </a:t>
+            </a:r>
+            <a:r>
+              <a:rPr lang="en-US" baseline="0" dirty="0" err="1" smtClean="0"/>
+              <a:t>dynjs</a:t>
+            </a:r>
+            <a:r>
+              <a:rPr lang="he-IL" baseline="0" dirty="0" smtClean="0"/>
+              <a:t> לא מכיר אותה.</a:t>
+            </a:r>
+            <a:endParaRPr lang="en-US" dirty="0"/>
+          </a:p>
+        </p:txBody>
+      </p:sp>
+      <p:sp>
+        <p:nvSpPr>
+          <p:cNvPr id="4" name="מציין מיקום של מספר שקופית 3"/>
+          <p:cNvSpPr>
+            <a:spLocks noGrp="1"/>
+          </p:cNvSpPr>
+          <p:nvPr>
+            <p:ph type="sldNum" sz="quarter" idx="10"/>
+          </p:nvPr>
+        </p:nvSpPr>
+        <p:spPr/>
+        <p:txBody>
+          <a:bodyPr/>
+          <a:lstStyle/>
+          <a:p>
+            <a:fld id="{7CE0F7BA-0DCF-444E-B259-543A16D6C1DD}" type="slidenum">
+              <a:rPr lang="en-US" smtClean="0"/>
+              <a:t>23</a:t>
+            </a:fld>
+            <a:endParaRPr lang="en-US"/>
+          </a:p>
+        </p:txBody>
+      </p:sp>
+    </p:spTree>
+    <p:extLst>
+      <p:ext uri="{BB962C8B-B14F-4D97-AF65-F5344CB8AC3E}">
+        <p14:creationId xmlns:p14="http://schemas.microsoft.com/office/powerpoint/2010/main" val="299955543"/>
+      </p:ext>
+    </p:extLst>
+  </p:cSld>
+  <p:clrMapOvr>
+    <a:masterClrMapping/>
+  </p:clrMapOvr>
+</p:notes>
+</file>
+
+<file path=ppt/notesSlides/notesSlide16.xml><?xml version="1.0" encoding="utf-8"?>
+<p:notes xmlns:a="http://schemas.openxmlformats.org/drawingml/2006/main" xmlns:r="http://schemas.openxmlformats.org/officeDocument/2006/relationships" xmlns:p="http://schemas.openxmlformats.org/presentationml/2006/main">
+  <p:cSld>
+    <p:spTree>
+      <p:nvGrpSpPr>
+        <p:cNvPr id="1" name=""/>
+        <p:cNvGrpSpPr/>
+        <p:nvPr/>
+      </p:nvGrpSpPr>
+      <p:grpSpPr>
+        <a:xfrm>
+          <a:off x="0" y="0"/>
+          <a:ext cx="0" cy="0"/>
+          <a:chOff x="0" y="0"/>
+          <a:chExt cx="0" cy="0"/>
+        </a:xfrm>
+      </p:grpSpPr>
+      <p:sp>
+        <p:nvSpPr>
+          <p:cNvPr id="2" name="מציין מיקום של תמונת שקופית 1"/>
+          <p:cNvSpPr>
+            <a:spLocks noGrp="1" noRot="1" noChangeAspect="1"/>
+          </p:cNvSpPr>
+          <p:nvPr>
+            <p:ph type="sldImg"/>
+          </p:nvPr>
+        </p:nvSpPr>
+        <p:spPr/>
+      </p:sp>
+      <p:sp>
+        <p:nvSpPr>
+          <p:cNvPr id="3" name="מציין מיקום של הערות 2"/>
+          <p:cNvSpPr>
+            <a:spLocks noGrp="1"/>
+          </p:cNvSpPr>
+          <p:nvPr>
+            <p:ph type="body" idx="1"/>
+          </p:nvPr>
+        </p:nvSpPr>
+        <p:spPr/>
+        <p:txBody>
+          <a:bodyPr/>
+          <a:lstStyle/>
+          <a:p>
+            <a:pPr algn="r" rtl="1"/>
+            <a:r>
+              <a:rPr lang="he-IL" dirty="0" smtClean="0"/>
+              <a:t>למרות שהפונקציה מוגדרת</a:t>
+            </a:r>
+            <a:r>
+              <a:rPr lang="he-IL" baseline="0" dirty="0" smtClean="0"/>
+              <a:t> ב-</a:t>
+            </a:r>
+            <a:r>
+              <a:rPr lang="en-US" baseline="0" dirty="0" smtClean="0"/>
+              <a:t>flow</a:t>
+            </a:r>
+            <a:r>
+              <a:rPr lang="he-IL" baseline="0" dirty="0" smtClean="0"/>
+              <a:t> שלא יתבצע, </a:t>
+            </a:r>
+            <a:r>
+              <a:rPr lang="en-US" baseline="0" dirty="0" err="1" smtClean="0"/>
+              <a:t>NodeJS</a:t>
+            </a:r>
+            <a:r>
+              <a:rPr lang="he-IL" baseline="0" dirty="0" smtClean="0"/>
+              <a:t> מכיר אותה.</a:t>
+            </a:r>
+            <a:endParaRPr lang="en-US" dirty="0"/>
+          </a:p>
+        </p:txBody>
+      </p:sp>
+      <p:sp>
+        <p:nvSpPr>
+          <p:cNvPr id="4" name="מציין מיקום של מספר שקופית 3"/>
+          <p:cNvSpPr>
+            <a:spLocks noGrp="1"/>
+          </p:cNvSpPr>
+          <p:nvPr>
+            <p:ph type="sldNum" sz="quarter" idx="10"/>
+          </p:nvPr>
+        </p:nvSpPr>
+        <p:spPr/>
+        <p:txBody>
+          <a:bodyPr/>
+          <a:lstStyle/>
+          <a:p>
+            <a:fld id="{7CE0F7BA-0DCF-444E-B259-543A16D6C1DD}" type="slidenum">
+              <a:rPr lang="en-US" smtClean="0"/>
+              <a:t>24</a:t>
+            </a:fld>
+            <a:endParaRPr lang="en-US"/>
+          </a:p>
+        </p:txBody>
+      </p:sp>
+    </p:spTree>
+    <p:extLst>
+      <p:ext uri="{BB962C8B-B14F-4D97-AF65-F5344CB8AC3E}">
+        <p14:creationId xmlns:p14="http://schemas.microsoft.com/office/powerpoint/2010/main" val="3344642267"/>
+      </p:ext>
+    </p:extLst>
+  </p:cSld>
+  <p:clrMapOvr>
+    <a:masterClrMapping/>
+  </p:clrMapOvr>
+</p:notes>
+</file>
+
+<file path=ppt/notesSlides/notesSlide17.xml><?xml version="1.0" encoding="utf-8"?>
+<p:notes xmlns:a="http://schemas.openxmlformats.org/drawingml/2006/main" xmlns:r="http://schemas.openxmlformats.org/officeDocument/2006/relationships" xmlns:p="http://schemas.openxmlformats.org/presentationml/2006/main">
+  <p:cSld>
+    <p:spTree>
+      <p:nvGrpSpPr>
+        <p:cNvPr id="1" name=""/>
+        <p:cNvGrpSpPr/>
+        <p:nvPr/>
+      </p:nvGrpSpPr>
+      <p:grpSpPr>
+        <a:xfrm>
+          <a:off x="0" y="0"/>
+          <a:ext cx="0" cy="0"/>
+          <a:chOff x="0" y="0"/>
+          <a:chExt cx="0" cy="0"/>
+        </a:xfrm>
+      </p:grpSpPr>
+      <p:sp>
+        <p:nvSpPr>
+          <p:cNvPr id="2" name="מציין מיקום של תמונת שקופית 1"/>
+          <p:cNvSpPr>
+            <a:spLocks noGrp="1" noRot="1" noChangeAspect="1"/>
+          </p:cNvSpPr>
+          <p:nvPr>
+            <p:ph type="sldImg"/>
+          </p:nvPr>
+        </p:nvSpPr>
+        <p:spPr/>
+      </p:sp>
+      <p:sp>
+        <p:nvSpPr>
+          <p:cNvPr id="3" name="מציין מיקום של הערות 2"/>
+          <p:cNvSpPr>
+            <a:spLocks noGrp="1"/>
+          </p:cNvSpPr>
+          <p:nvPr>
+            <p:ph type="body" idx="1"/>
+          </p:nvPr>
+        </p:nvSpPr>
+        <p:spPr/>
+        <p:txBody>
+          <a:bodyPr/>
+          <a:lstStyle/>
+          <a:p>
+            <a:pPr algn="r" rtl="1"/>
+            <a:r>
+              <a:rPr lang="he-IL" dirty="0" smtClean="0"/>
+              <a:t>ב-</a:t>
+            </a:r>
+            <a:r>
+              <a:rPr lang="en-US" dirty="0" err="1" smtClean="0"/>
+              <a:t>dynjs</a:t>
+            </a:r>
+            <a:r>
+              <a:rPr lang="he-IL" baseline="0" dirty="0" smtClean="0"/>
+              <a:t> </a:t>
+            </a:r>
+            <a:r>
+              <a:rPr lang="en-US" baseline="0" dirty="0" err="1" smtClean="0"/>
+              <a:t>arr.push</a:t>
+            </a:r>
+            <a:r>
+              <a:rPr lang="en-US" baseline="0" dirty="0" smtClean="0"/>
+              <a:t>(undefined)</a:t>
+            </a:r>
+            <a:r>
+              <a:rPr lang="he-IL" baseline="0" dirty="0" smtClean="0"/>
+              <a:t> לא מבצע שום דבר, להבדיל ממנועים אחרים</a:t>
+            </a:r>
+          </a:p>
+          <a:p>
+            <a:pPr algn="r" rtl="1"/>
+            <a:r>
+              <a:rPr lang="he-IL" baseline="0" dirty="0" smtClean="0"/>
+              <a:t>מצאנו את המקום בקוד המקור שהוא הגורם לבאג.</a:t>
+            </a:r>
+            <a:endParaRPr lang="en-US" dirty="0"/>
+          </a:p>
+        </p:txBody>
+      </p:sp>
+      <p:sp>
+        <p:nvSpPr>
+          <p:cNvPr id="4" name="מציין מיקום של מספר שקופית 3"/>
+          <p:cNvSpPr>
+            <a:spLocks noGrp="1"/>
+          </p:cNvSpPr>
+          <p:nvPr>
+            <p:ph type="sldNum" sz="quarter" idx="10"/>
+          </p:nvPr>
+        </p:nvSpPr>
+        <p:spPr/>
+        <p:txBody>
+          <a:bodyPr/>
+          <a:lstStyle/>
+          <a:p>
+            <a:fld id="{7CE0F7BA-0DCF-444E-B259-543A16D6C1DD}" type="slidenum">
+              <a:rPr lang="en-US" smtClean="0"/>
+              <a:t>25</a:t>
+            </a:fld>
+            <a:endParaRPr lang="en-US"/>
+          </a:p>
+        </p:txBody>
+      </p:sp>
+    </p:spTree>
+    <p:extLst>
+      <p:ext uri="{BB962C8B-B14F-4D97-AF65-F5344CB8AC3E}">
+        <p14:creationId xmlns:p14="http://schemas.microsoft.com/office/powerpoint/2010/main" val="1617176913"/>
+      </p:ext>
+    </p:extLst>
+  </p:cSld>
+  <p:clrMapOvr>
+    <a:masterClrMapping/>
+  </p:clrMapOvr>
+</p:notes>
+</file>
+
+<file path=ppt/notesSlides/notesSlide18.xml><?xml version="1.0" encoding="utf-8"?>
+<p:notes xmlns:a="http://schemas.openxmlformats.org/drawingml/2006/main" xmlns:r="http://schemas.openxmlformats.org/officeDocument/2006/relationships" xmlns:p="http://schemas.openxmlformats.org/presentationml/2006/main">
+  <p:cSld>
+    <p:spTree>
+      <p:nvGrpSpPr>
+        <p:cNvPr id="1" name=""/>
+        <p:cNvGrpSpPr/>
+        <p:nvPr/>
+      </p:nvGrpSpPr>
+      <p:grpSpPr>
+        <a:xfrm>
+          <a:off x="0" y="0"/>
+          <a:ext cx="0" cy="0"/>
+          <a:chOff x="0" y="0"/>
+          <a:chExt cx="0" cy="0"/>
+        </a:xfrm>
+      </p:grpSpPr>
+      <p:sp>
+        <p:nvSpPr>
+          <p:cNvPr id="2" name="מציין מיקום של תמונת שקופית 1"/>
+          <p:cNvSpPr>
+            <a:spLocks noGrp="1" noRot="1" noChangeAspect="1"/>
+          </p:cNvSpPr>
+          <p:nvPr>
+            <p:ph type="sldImg"/>
+          </p:nvPr>
+        </p:nvSpPr>
+        <p:spPr/>
+      </p:sp>
+      <p:sp>
+        <p:nvSpPr>
+          <p:cNvPr id="3" name="מציין מיקום של הערות 2"/>
+          <p:cNvSpPr>
+            <a:spLocks noGrp="1"/>
+          </p:cNvSpPr>
+          <p:nvPr>
+            <p:ph type="body" idx="1"/>
+          </p:nvPr>
+        </p:nvSpPr>
+        <p:spPr/>
+        <p:txBody>
+          <a:bodyPr/>
+          <a:lstStyle/>
+          <a:p>
+            <a:pPr algn="r" rtl="1"/>
+            <a:endParaRPr lang="en-US" dirty="0"/>
+          </a:p>
+        </p:txBody>
+      </p:sp>
+      <p:sp>
+        <p:nvSpPr>
+          <p:cNvPr id="4" name="מציין מיקום של מספר שקופית 3"/>
+          <p:cNvSpPr>
+            <a:spLocks noGrp="1"/>
+          </p:cNvSpPr>
+          <p:nvPr>
+            <p:ph type="sldNum" sz="quarter" idx="10"/>
+          </p:nvPr>
+        </p:nvSpPr>
+        <p:spPr/>
+        <p:txBody>
+          <a:bodyPr/>
+          <a:lstStyle/>
+          <a:p>
+            <a:fld id="{7CE0F7BA-0DCF-444E-B259-543A16D6C1DD}" type="slidenum">
+              <a:rPr lang="en-US" smtClean="0"/>
+              <a:t>26</a:t>
+            </a:fld>
+            <a:endParaRPr lang="en-US"/>
+          </a:p>
+        </p:txBody>
+      </p:sp>
+    </p:spTree>
+    <p:extLst>
+      <p:ext uri="{BB962C8B-B14F-4D97-AF65-F5344CB8AC3E}">
+        <p14:creationId xmlns:p14="http://schemas.microsoft.com/office/powerpoint/2010/main" val="2781907208"/>
       </p:ext>
     </p:extLst>
   </p:cSld>
@@ -11857,6 +12260,13 @@
   <p:clrMapOvr>
     <a:masterClrMapping/>
   </p:clrMapOvr>
+  <p:timing>
+    <p:tnLst>
+      <p:par>
+        <p:cTn id="1" dur="indefinite" restart="never" nodeType="tmRoot"/>
+      </p:par>
+    </p:tnLst>
+  </p:timing>
 </p:sld>
 </file>
 
@@ -12962,11 +13372,7 @@
           <a:p>
             <a:r>
               <a:rPr lang="en-US" sz="5400" dirty="0" smtClean="0"/>
-              <a:t>Nashorn – Dead Code </a:t>
-            </a:r>
-            <a:r>
-              <a:rPr lang="en-US" sz="5400" dirty="0" smtClean="0"/>
-              <a:t>Elimination (1)</a:t>
+              <a:t>Nashorn – Dead Code Elimination (1)</a:t>
             </a:r>
             <a:r>
               <a:rPr lang="en-US" sz="4400" dirty="0" smtClean="0"/>
@@ -12988,7 +13394,7 @@
         <p:spPr>
           <a:xfrm>
             <a:off x="631461" y="2413416"/>
-            <a:ext cx="7198860" cy="1938992"/>
+            <a:ext cx="7198860" cy="2677656"/>
           </a:xfrm>
           <a:prstGeom prst="rect">
             <a:avLst/>
@@ -13015,10 +13421,40 @@
             <a:endParaRPr lang="en-US" sz="2400" dirty="0"/>
           </a:p>
           <a:p>
+            <a:pPr marL="342900" indent="-342900">
+              <a:buFont typeface="Arial" panose="020B0604020202020204" pitchFamily="34" charset="0"/>
+              <a:buChar char="•"/>
+            </a:pPr>
             <a:r>
               <a:rPr lang="en-US" sz="2400" dirty="0" smtClean="0"/>
-              <a:t>Dead code elimination corrupts the global scope.</a:t>
-            </a:r>
+              <a:t>Dead code elimination corrupts the global </a:t>
+            </a:r>
+            <a:r>
+              <a:rPr lang="en-US" sz="2400" dirty="0" smtClean="0"/>
+              <a:t>scope</a:t>
+            </a:r>
+          </a:p>
+          <a:p>
+            <a:pPr marL="342900" indent="-342900">
+              <a:buFont typeface="Arial" panose="020B0604020202020204" pitchFamily="34" charset="0"/>
+              <a:buChar char="•"/>
+            </a:pPr>
+            <a:endParaRPr lang="en-US" sz="2400" i="1" dirty="0" smtClean="0"/>
+          </a:p>
+          <a:p>
+            <a:pPr marL="342900" indent="-342900">
+              <a:buFont typeface="Arial" panose="020B0604020202020204" pitchFamily="34" charset="0"/>
+              <a:buChar char="•"/>
+            </a:pPr>
+            <a:r>
+              <a:rPr lang="en-US" sz="2400" i="1" dirty="0" smtClean="0"/>
+              <a:t>Print </a:t>
+            </a:r>
+            <a:r>
+              <a:rPr lang="en-US" sz="2400" dirty="0" smtClean="0"/>
+              <a:t>turns to be undefined</a:t>
+            </a:r>
+            <a:endParaRPr lang="en-US" sz="2400" i="1" dirty="0" smtClean="0"/>
           </a:p>
           <a:p>
             <a:r>
@@ -13475,11 +13911,7 @@
           <a:p>
             <a:r>
               <a:rPr lang="en-US" sz="4000" dirty="0" smtClean="0"/>
-              <a:t>Nashorn – Dead Code </a:t>
-            </a:r>
-            <a:r>
-              <a:rPr lang="en-US" sz="4000" dirty="0" smtClean="0"/>
-              <a:t>Elimination (2)</a:t>
+              <a:t>Nashorn – Dead Code Elimination (2)</a:t>
             </a:r>
             <a:r>
               <a:rPr lang="en-US" sz="4400" dirty="0" smtClean="0"/>
@@ -13584,6 +14016,2684 @@
     <p:extLst>
       <p:ext uri="{BB962C8B-B14F-4D97-AF65-F5344CB8AC3E}">
         <p14:creationId xmlns:p14="http://schemas.microsoft.com/office/powerpoint/2010/main" val="2532034860"/>
+      </p:ext>
+    </p:extLst>
+  </p:cSld>
+  <p:clrMapOvr>
+    <a:masterClrMapping/>
+  </p:clrMapOvr>
+  <p:timing>
+    <p:tnLst>
+      <p:par>
+        <p:cTn id="1" dur="indefinite" restart="never" nodeType="tmRoot"/>
+      </p:par>
+    </p:tnLst>
+  </p:timing>
+</p:sld>
+</file>
+
+<file path=ppt/slides/slide23.xml><?xml version="1.0" encoding="utf-8"?>
+<p:sld xmlns:a="http://schemas.openxmlformats.org/drawingml/2006/main" xmlns:r="http://schemas.openxmlformats.org/officeDocument/2006/relationships" xmlns:p="http://schemas.openxmlformats.org/presentationml/2006/main">
+  <p:cSld>
+    <p:spTree>
+      <p:nvGrpSpPr>
+        <p:cNvPr id="1" name=""/>
+        <p:cNvGrpSpPr/>
+        <p:nvPr/>
+      </p:nvGrpSpPr>
+      <p:grpSpPr>
+        <a:xfrm>
+          <a:off x="0" y="0"/>
+          <a:ext cx="0" cy="0"/>
+          <a:chOff x="0" y="0"/>
+          <a:chExt cx="0" cy="0"/>
+        </a:xfrm>
+      </p:grpSpPr>
+      <p:sp>
+        <p:nvSpPr>
+          <p:cNvPr id="4" name="Subtitle 2"/>
+          <p:cNvSpPr txBox="1">
+            <a:spLocks/>
+          </p:cNvSpPr>
+          <p:nvPr/>
+        </p:nvSpPr>
+        <p:spPr>
+          <a:xfrm>
+            <a:off x="242889" y="1163755"/>
+            <a:ext cx="11118162" cy="4812163"/>
+          </a:xfrm>
+          <a:prstGeom prst="rect">
+            <a:avLst/>
+          </a:prstGeom>
+        </p:spPr>
+        <p:txBody>
+          <a:bodyPr vert="horz" lIns="91440" tIns="45720" rIns="91440" bIns="45720" rtlCol="0" anchor="t">
+            <a:normAutofit/>
+          </a:bodyPr>
+          <a:lstStyle>
+            <a:lvl1pPr marL="0" indent="0" algn="l" defTabSz="457200" rtl="0" eaLnBrk="1" latinLnBrk="0" hangingPunct="1">
+              <a:spcBef>
+                <a:spcPts val="1000"/>
+              </a:spcBef>
+              <a:spcAft>
+                <a:spcPts val="0"/>
+              </a:spcAft>
+              <a:buClr>
+                <a:schemeClr val="bg2">
+                  <a:lumMod val="40000"/>
+                  <a:lumOff val="60000"/>
+                </a:schemeClr>
+              </a:buClr>
+              <a:buSzPct val="80000"/>
+              <a:buFont typeface="Wingdings 3" charset="2"/>
+              <a:buNone/>
+              <a:defRPr sz="2000" b="0" i="0" kern="1200" cap="all">
+                <a:solidFill>
+                  <a:schemeClr val="bg2">
+                    <a:lumMod val="40000"/>
+                    <a:lumOff val="60000"/>
+                  </a:schemeClr>
+                </a:solidFill>
+                <a:latin typeface="+mj-lt"/>
+                <a:ea typeface="+mj-ea"/>
+                <a:cs typeface="+mj-cs"/>
+              </a:defRPr>
+            </a:lvl1pPr>
+            <a:lvl2pPr marL="457200" indent="0" algn="ctr" defTabSz="457200" rtl="0" eaLnBrk="1" latinLnBrk="0" hangingPunct="1">
+              <a:spcBef>
+                <a:spcPts val="1000"/>
+              </a:spcBef>
+              <a:spcAft>
+                <a:spcPts val="0"/>
+              </a:spcAft>
+              <a:buClr>
+                <a:schemeClr val="bg2">
+                  <a:lumMod val="40000"/>
+                  <a:lumOff val="60000"/>
+                </a:schemeClr>
+              </a:buClr>
+              <a:buSzPct val="80000"/>
+              <a:buFont typeface="Wingdings 3" charset="2"/>
+              <a:buNone/>
+              <a:defRPr sz="1800" b="0" i="0" kern="1200">
+                <a:solidFill>
+                  <a:schemeClr val="tx1">
+                    <a:tint val="75000"/>
+                  </a:schemeClr>
+                </a:solidFill>
+                <a:latin typeface="+mj-lt"/>
+                <a:ea typeface="+mj-ea"/>
+                <a:cs typeface="+mj-cs"/>
+              </a:defRPr>
+            </a:lvl2pPr>
+            <a:lvl3pPr marL="914400" indent="0" algn="ctr" defTabSz="457200" rtl="0" eaLnBrk="1" latinLnBrk="0" hangingPunct="1">
+              <a:spcBef>
+                <a:spcPts val="1000"/>
+              </a:spcBef>
+              <a:spcAft>
+                <a:spcPts val="0"/>
+              </a:spcAft>
+              <a:buClr>
+                <a:schemeClr val="bg2">
+                  <a:lumMod val="40000"/>
+                  <a:lumOff val="60000"/>
+                </a:schemeClr>
+              </a:buClr>
+              <a:buSzPct val="80000"/>
+              <a:buFont typeface="Wingdings 3" charset="2"/>
+              <a:buNone/>
+              <a:defRPr sz="1600" b="0" i="0" kern="1200">
+                <a:solidFill>
+                  <a:schemeClr val="tx1">
+                    <a:tint val="75000"/>
+                  </a:schemeClr>
+                </a:solidFill>
+                <a:latin typeface="+mj-lt"/>
+                <a:ea typeface="+mj-ea"/>
+                <a:cs typeface="+mj-cs"/>
+              </a:defRPr>
+            </a:lvl3pPr>
+            <a:lvl4pPr marL="1371600" indent="0" algn="ctr" defTabSz="457200" rtl="0" eaLnBrk="1" latinLnBrk="0" hangingPunct="1">
+              <a:spcBef>
+                <a:spcPts val="1000"/>
+              </a:spcBef>
+              <a:spcAft>
+                <a:spcPts val="0"/>
+              </a:spcAft>
+              <a:buClr>
+                <a:schemeClr val="bg2">
+                  <a:lumMod val="40000"/>
+                  <a:lumOff val="60000"/>
+                </a:schemeClr>
+              </a:buClr>
+              <a:buSzPct val="80000"/>
+              <a:buFont typeface="Wingdings 3" charset="2"/>
+              <a:buNone/>
+              <a:defRPr sz="1400" b="0" i="0" kern="1200">
+                <a:solidFill>
+                  <a:schemeClr val="tx1">
+                    <a:tint val="75000"/>
+                  </a:schemeClr>
+                </a:solidFill>
+                <a:latin typeface="+mj-lt"/>
+                <a:ea typeface="+mj-ea"/>
+                <a:cs typeface="+mj-cs"/>
+              </a:defRPr>
+            </a:lvl4pPr>
+            <a:lvl5pPr marL="1828800" indent="0" algn="ctr" defTabSz="457200" rtl="0" eaLnBrk="1" latinLnBrk="0" hangingPunct="1">
+              <a:spcBef>
+                <a:spcPts val="1000"/>
+              </a:spcBef>
+              <a:spcAft>
+                <a:spcPts val="0"/>
+              </a:spcAft>
+              <a:buClr>
+                <a:schemeClr val="bg2">
+                  <a:lumMod val="40000"/>
+                  <a:lumOff val="60000"/>
+                </a:schemeClr>
+              </a:buClr>
+              <a:buSzPct val="80000"/>
+              <a:buFont typeface="Wingdings 3" charset="2"/>
+              <a:buNone/>
+              <a:defRPr sz="1400" b="0" i="0" kern="1200">
+                <a:solidFill>
+                  <a:schemeClr val="tx1">
+                    <a:tint val="75000"/>
+                  </a:schemeClr>
+                </a:solidFill>
+                <a:latin typeface="+mj-lt"/>
+                <a:ea typeface="+mj-ea"/>
+                <a:cs typeface="+mj-cs"/>
+              </a:defRPr>
+            </a:lvl5pPr>
+            <a:lvl6pPr marL="2286000" indent="0" algn="ctr" defTabSz="457200" rtl="0" eaLnBrk="1" latinLnBrk="0" hangingPunct="1">
+              <a:spcBef>
+                <a:spcPts val="1000"/>
+              </a:spcBef>
+              <a:spcAft>
+                <a:spcPts val="0"/>
+              </a:spcAft>
+              <a:buClr>
+                <a:schemeClr val="bg2">
+                  <a:lumMod val="40000"/>
+                  <a:lumOff val="60000"/>
+                </a:schemeClr>
+              </a:buClr>
+              <a:buSzPct val="80000"/>
+              <a:buFont typeface="Wingdings 3" charset="2"/>
+              <a:buNone/>
+              <a:defRPr sz="1400" b="0" i="0" kern="1200">
+                <a:solidFill>
+                  <a:schemeClr val="tx1">
+                    <a:tint val="75000"/>
+                  </a:schemeClr>
+                </a:solidFill>
+                <a:latin typeface="+mj-lt"/>
+                <a:ea typeface="+mj-ea"/>
+                <a:cs typeface="+mj-cs"/>
+              </a:defRPr>
+            </a:lvl6pPr>
+            <a:lvl7pPr marL="2743200" indent="0" algn="ctr" defTabSz="457200" rtl="0" eaLnBrk="1" latinLnBrk="0" hangingPunct="1">
+              <a:spcBef>
+                <a:spcPts val="1000"/>
+              </a:spcBef>
+              <a:spcAft>
+                <a:spcPts val="0"/>
+              </a:spcAft>
+              <a:buClr>
+                <a:schemeClr val="bg2">
+                  <a:lumMod val="40000"/>
+                  <a:lumOff val="60000"/>
+                </a:schemeClr>
+              </a:buClr>
+              <a:buSzPct val="80000"/>
+              <a:buFont typeface="Wingdings 3" charset="2"/>
+              <a:buNone/>
+              <a:defRPr sz="1400" b="0" i="0" kern="1200">
+                <a:solidFill>
+                  <a:schemeClr val="tx1">
+                    <a:tint val="75000"/>
+                  </a:schemeClr>
+                </a:solidFill>
+                <a:latin typeface="+mj-lt"/>
+                <a:ea typeface="+mj-ea"/>
+                <a:cs typeface="+mj-cs"/>
+              </a:defRPr>
+            </a:lvl7pPr>
+            <a:lvl8pPr marL="3200400" indent="0" algn="ctr" defTabSz="457200" rtl="0" eaLnBrk="1" latinLnBrk="0" hangingPunct="1">
+              <a:spcBef>
+                <a:spcPts val="1000"/>
+              </a:spcBef>
+              <a:spcAft>
+                <a:spcPts val="0"/>
+              </a:spcAft>
+              <a:buClr>
+                <a:schemeClr val="bg2">
+                  <a:lumMod val="40000"/>
+                  <a:lumOff val="60000"/>
+                </a:schemeClr>
+              </a:buClr>
+              <a:buSzPct val="80000"/>
+              <a:buFont typeface="Wingdings 3" charset="2"/>
+              <a:buNone/>
+              <a:defRPr sz="1400" b="0" i="0" kern="1200">
+                <a:solidFill>
+                  <a:schemeClr val="tx1">
+                    <a:tint val="75000"/>
+                  </a:schemeClr>
+                </a:solidFill>
+                <a:latin typeface="+mj-lt"/>
+                <a:ea typeface="+mj-ea"/>
+                <a:cs typeface="+mj-cs"/>
+              </a:defRPr>
+            </a:lvl8pPr>
+            <a:lvl9pPr marL="3657600" indent="0" algn="ctr" defTabSz="457200" rtl="0" eaLnBrk="1" latinLnBrk="0" hangingPunct="1">
+              <a:spcBef>
+                <a:spcPts val="1000"/>
+              </a:spcBef>
+              <a:spcAft>
+                <a:spcPts val="0"/>
+              </a:spcAft>
+              <a:buClr>
+                <a:schemeClr val="bg2">
+                  <a:lumMod val="40000"/>
+                  <a:lumOff val="60000"/>
+                </a:schemeClr>
+              </a:buClr>
+              <a:buSzPct val="80000"/>
+              <a:buFont typeface="Wingdings 3" charset="2"/>
+              <a:buNone/>
+              <a:defRPr sz="1400" b="0" i="0" kern="1200">
+                <a:solidFill>
+                  <a:schemeClr val="tx1">
+                    <a:tint val="75000"/>
+                  </a:schemeClr>
+                </a:solidFill>
+                <a:latin typeface="+mj-lt"/>
+                <a:ea typeface="+mj-ea"/>
+                <a:cs typeface="+mj-cs"/>
+              </a:defRPr>
+            </a:lvl9pPr>
+          </a:lstStyle>
+          <a:p>
+            <a:r>
+              <a:rPr lang="en-US" dirty="0" smtClean="0"/>
+              <a:t>	</a:t>
+            </a:r>
+          </a:p>
+          <a:p>
+            <a:pPr marL="1257300" lvl="2" indent="-342900" algn="l">
+              <a:buFont typeface="Arial" panose="020B0604020202020204" pitchFamily="34" charset="0"/>
+              <a:buChar char="•"/>
+            </a:pPr>
+            <a:endParaRPr lang="en-US" sz="2200" dirty="0" smtClean="0">
+              <a:solidFill>
+                <a:schemeClr val="accent3">
+                  <a:lumMod val="40000"/>
+                  <a:lumOff val="60000"/>
+                </a:schemeClr>
+              </a:solidFill>
+            </a:endParaRPr>
+          </a:p>
+        </p:txBody>
+      </p:sp>
+      <p:sp>
+        <p:nvSpPr>
+          <p:cNvPr id="6" name="Title 1"/>
+          <p:cNvSpPr txBox="1">
+            <a:spLocks/>
+          </p:cNvSpPr>
+          <p:nvPr/>
+        </p:nvSpPr>
+        <p:spPr>
+          <a:xfrm>
+            <a:off x="383811" y="878154"/>
+            <a:ext cx="9912714" cy="1054100"/>
+          </a:xfrm>
+          <a:prstGeom prst="rect">
+            <a:avLst/>
+          </a:prstGeom>
+        </p:spPr>
+        <p:txBody>
+          <a:bodyPr vert="horz" lIns="91440" tIns="45720" rIns="91440" bIns="45720" rtlCol="0" anchor="b">
+            <a:noAutofit/>
+          </a:bodyPr>
+          <a:lstStyle>
+            <a:lvl1pPr algn="l" defTabSz="457200" rtl="0" eaLnBrk="1" latinLnBrk="0" hangingPunct="1">
+              <a:spcBef>
+                <a:spcPct val="0"/>
+              </a:spcBef>
+              <a:buNone/>
+              <a:defRPr sz="7200" b="0" i="0" kern="1200">
+                <a:solidFill>
+                  <a:schemeClr val="tx2"/>
+                </a:solidFill>
+                <a:latin typeface="+mj-lt"/>
+                <a:ea typeface="+mj-ea"/>
+                <a:cs typeface="+mj-cs"/>
+              </a:defRPr>
+            </a:lvl1pPr>
+            <a:lvl2pPr eaLnBrk="1" hangingPunct="1">
+              <a:defRPr>
+                <a:solidFill>
+                  <a:schemeClr val="tx2"/>
+                </a:solidFill>
+              </a:defRPr>
+            </a:lvl2pPr>
+            <a:lvl3pPr eaLnBrk="1" hangingPunct="1">
+              <a:defRPr>
+                <a:solidFill>
+                  <a:schemeClr val="tx2"/>
+                </a:solidFill>
+              </a:defRPr>
+            </a:lvl3pPr>
+            <a:lvl4pPr eaLnBrk="1" hangingPunct="1">
+              <a:defRPr>
+                <a:solidFill>
+                  <a:schemeClr val="tx2"/>
+                </a:solidFill>
+              </a:defRPr>
+            </a:lvl4pPr>
+            <a:lvl5pPr eaLnBrk="1" hangingPunct="1">
+              <a:defRPr>
+                <a:solidFill>
+                  <a:schemeClr val="tx2"/>
+                </a:solidFill>
+              </a:defRPr>
+            </a:lvl5pPr>
+            <a:lvl6pPr eaLnBrk="1" hangingPunct="1">
+              <a:defRPr>
+                <a:solidFill>
+                  <a:schemeClr val="tx2"/>
+                </a:solidFill>
+              </a:defRPr>
+            </a:lvl6pPr>
+            <a:lvl7pPr eaLnBrk="1" hangingPunct="1">
+              <a:defRPr>
+                <a:solidFill>
+                  <a:schemeClr val="tx2"/>
+                </a:solidFill>
+              </a:defRPr>
+            </a:lvl7pPr>
+            <a:lvl8pPr eaLnBrk="1" hangingPunct="1">
+              <a:defRPr>
+                <a:solidFill>
+                  <a:schemeClr val="tx2"/>
+                </a:solidFill>
+              </a:defRPr>
+            </a:lvl8pPr>
+            <a:lvl9pPr eaLnBrk="1" hangingPunct="1">
+              <a:defRPr>
+                <a:solidFill>
+                  <a:schemeClr val="tx2"/>
+                </a:solidFill>
+              </a:defRPr>
+            </a:lvl9pPr>
+          </a:lstStyle>
+          <a:p>
+            <a:r>
+              <a:rPr lang="en-US" sz="5400" dirty="0" smtClean="0"/>
+              <a:t>DynJS </a:t>
+            </a:r>
+            <a:r>
+              <a:rPr lang="en-US" sz="5400" dirty="0" smtClean="0"/>
+              <a:t>– </a:t>
+            </a:r>
+            <a:r>
+              <a:rPr lang="en-US" sz="5400" dirty="0" smtClean="0"/>
+              <a:t>Conditional Function Definition (1)</a:t>
+            </a:r>
+            <a:endParaRPr lang="he-IL" sz="4400" dirty="0"/>
+          </a:p>
+        </p:txBody>
+      </p:sp>
+      <p:sp>
+        <p:nvSpPr>
+          <p:cNvPr id="2" name="TextBox 1"/>
+          <p:cNvSpPr txBox="1"/>
+          <p:nvPr/>
+        </p:nvSpPr>
+        <p:spPr>
+          <a:xfrm>
+            <a:off x="1123949" y="2785006"/>
+            <a:ext cx="5811021" cy="1569660"/>
+          </a:xfrm>
+          <a:prstGeom prst="rect">
+            <a:avLst/>
+          </a:prstGeom>
+          <a:noFill/>
+        </p:spPr>
+        <p:txBody>
+          <a:bodyPr wrap="square" rtlCol="0">
+            <a:spAutoFit/>
+          </a:bodyPr>
+          <a:lstStyle/>
+          <a:p>
+            <a:pPr marL="342900" indent="-342900">
+              <a:buFont typeface="Arial" panose="020B0604020202020204" pitchFamily="34" charset="0"/>
+              <a:buChar char="•"/>
+            </a:pPr>
+            <a:endParaRPr lang="en-US" sz="2400" dirty="0" smtClean="0"/>
+          </a:p>
+          <a:p>
+            <a:pPr marL="342900" indent="-342900">
+              <a:buFont typeface="Arial" panose="020B0604020202020204" pitchFamily="34" charset="0"/>
+              <a:buChar char="•"/>
+            </a:pPr>
+            <a:r>
+              <a:rPr lang="en-US" sz="2400" dirty="0"/>
+              <a:t>DynJS: Reference </a:t>
+            </a:r>
+            <a:r>
+              <a:rPr lang="en-US" sz="2400" dirty="0" smtClean="0"/>
+              <a:t>Error</a:t>
+            </a:r>
+          </a:p>
+          <a:p>
+            <a:pPr marL="342900" indent="-342900">
+              <a:buFont typeface="Arial" panose="020B0604020202020204" pitchFamily="34" charset="0"/>
+              <a:buChar char="•"/>
+            </a:pPr>
+            <a:endParaRPr lang="en-US" sz="2400" dirty="0"/>
+          </a:p>
+          <a:p>
+            <a:pPr marL="342900" indent="-342900">
+              <a:buFont typeface="Arial" panose="020B0604020202020204" pitchFamily="34" charset="0"/>
+              <a:buChar char="•"/>
+            </a:pPr>
+            <a:r>
+              <a:rPr lang="en-US" sz="2400" dirty="0" smtClean="0"/>
+              <a:t>Other Engines: fine execution</a:t>
+            </a:r>
+            <a:endParaRPr lang="en-US" sz="2400" dirty="0"/>
+          </a:p>
+        </p:txBody>
+      </p:sp>
+      <p:pic>
+        <p:nvPicPr>
+          <p:cNvPr id="5" name="תמונה 4"/>
+          <p:cNvPicPr>
+            <a:picLocks noChangeAspect="1"/>
+          </p:cNvPicPr>
+          <p:nvPr/>
+        </p:nvPicPr>
+        <p:blipFill>
+          <a:blip r:embed="rId3"/>
+          <a:stretch>
+            <a:fillRect/>
+          </a:stretch>
+        </p:blipFill>
+        <p:spPr>
+          <a:xfrm>
+            <a:off x="7183129" y="2668133"/>
+            <a:ext cx="4276845" cy="2462426"/>
+          </a:xfrm>
+          <a:prstGeom prst="rect">
+            <a:avLst/>
+          </a:prstGeom>
+        </p:spPr>
+      </p:pic>
+    </p:spTree>
+    <p:extLst>
+      <p:ext uri="{BB962C8B-B14F-4D97-AF65-F5344CB8AC3E}">
+        <p14:creationId xmlns:p14="http://schemas.microsoft.com/office/powerpoint/2010/main" val="3693962376"/>
+      </p:ext>
+    </p:extLst>
+  </p:cSld>
+  <p:clrMapOvr>
+    <a:masterClrMapping/>
+  </p:clrMapOvr>
+  <p:timing>
+    <p:tnLst>
+      <p:par>
+        <p:cTn id="1" dur="indefinite" restart="never" nodeType="tmRoot"/>
+      </p:par>
+    </p:tnLst>
+  </p:timing>
+</p:sld>
+</file>
+
+<file path=ppt/slides/slide24.xml><?xml version="1.0" encoding="utf-8"?>
+<p:sld xmlns:a="http://schemas.openxmlformats.org/drawingml/2006/main" xmlns:r="http://schemas.openxmlformats.org/officeDocument/2006/relationships" xmlns:p="http://schemas.openxmlformats.org/presentationml/2006/main">
+  <p:cSld>
+    <p:spTree>
+      <p:nvGrpSpPr>
+        <p:cNvPr id="1" name=""/>
+        <p:cNvGrpSpPr/>
+        <p:nvPr/>
+      </p:nvGrpSpPr>
+      <p:grpSpPr>
+        <a:xfrm>
+          <a:off x="0" y="0"/>
+          <a:ext cx="0" cy="0"/>
+          <a:chOff x="0" y="0"/>
+          <a:chExt cx="0" cy="0"/>
+        </a:xfrm>
+      </p:grpSpPr>
+      <p:sp>
+        <p:nvSpPr>
+          <p:cNvPr id="4" name="Subtitle 2"/>
+          <p:cNvSpPr txBox="1">
+            <a:spLocks/>
+          </p:cNvSpPr>
+          <p:nvPr/>
+        </p:nvSpPr>
+        <p:spPr>
+          <a:xfrm>
+            <a:off x="242889" y="1163755"/>
+            <a:ext cx="11118162" cy="4812163"/>
+          </a:xfrm>
+          <a:prstGeom prst="rect">
+            <a:avLst/>
+          </a:prstGeom>
+        </p:spPr>
+        <p:txBody>
+          <a:bodyPr vert="horz" lIns="91440" tIns="45720" rIns="91440" bIns="45720" rtlCol="0" anchor="t">
+            <a:normAutofit/>
+          </a:bodyPr>
+          <a:lstStyle>
+            <a:lvl1pPr marL="0" indent="0" algn="l" defTabSz="457200" rtl="0" eaLnBrk="1" latinLnBrk="0" hangingPunct="1">
+              <a:spcBef>
+                <a:spcPts val="1000"/>
+              </a:spcBef>
+              <a:spcAft>
+                <a:spcPts val="0"/>
+              </a:spcAft>
+              <a:buClr>
+                <a:schemeClr val="bg2">
+                  <a:lumMod val="40000"/>
+                  <a:lumOff val="60000"/>
+                </a:schemeClr>
+              </a:buClr>
+              <a:buSzPct val="80000"/>
+              <a:buFont typeface="Wingdings 3" charset="2"/>
+              <a:buNone/>
+              <a:defRPr sz="2000" b="0" i="0" kern="1200" cap="all">
+                <a:solidFill>
+                  <a:schemeClr val="bg2">
+                    <a:lumMod val="40000"/>
+                    <a:lumOff val="60000"/>
+                  </a:schemeClr>
+                </a:solidFill>
+                <a:latin typeface="+mj-lt"/>
+                <a:ea typeface="+mj-ea"/>
+                <a:cs typeface="+mj-cs"/>
+              </a:defRPr>
+            </a:lvl1pPr>
+            <a:lvl2pPr marL="457200" indent="0" algn="ctr" defTabSz="457200" rtl="0" eaLnBrk="1" latinLnBrk="0" hangingPunct="1">
+              <a:spcBef>
+                <a:spcPts val="1000"/>
+              </a:spcBef>
+              <a:spcAft>
+                <a:spcPts val="0"/>
+              </a:spcAft>
+              <a:buClr>
+                <a:schemeClr val="bg2">
+                  <a:lumMod val="40000"/>
+                  <a:lumOff val="60000"/>
+                </a:schemeClr>
+              </a:buClr>
+              <a:buSzPct val="80000"/>
+              <a:buFont typeface="Wingdings 3" charset="2"/>
+              <a:buNone/>
+              <a:defRPr sz="1800" b="0" i="0" kern="1200">
+                <a:solidFill>
+                  <a:schemeClr val="tx1">
+                    <a:tint val="75000"/>
+                  </a:schemeClr>
+                </a:solidFill>
+                <a:latin typeface="+mj-lt"/>
+                <a:ea typeface="+mj-ea"/>
+                <a:cs typeface="+mj-cs"/>
+              </a:defRPr>
+            </a:lvl2pPr>
+            <a:lvl3pPr marL="914400" indent="0" algn="ctr" defTabSz="457200" rtl="0" eaLnBrk="1" latinLnBrk="0" hangingPunct="1">
+              <a:spcBef>
+                <a:spcPts val="1000"/>
+              </a:spcBef>
+              <a:spcAft>
+                <a:spcPts val="0"/>
+              </a:spcAft>
+              <a:buClr>
+                <a:schemeClr val="bg2">
+                  <a:lumMod val="40000"/>
+                  <a:lumOff val="60000"/>
+                </a:schemeClr>
+              </a:buClr>
+              <a:buSzPct val="80000"/>
+              <a:buFont typeface="Wingdings 3" charset="2"/>
+              <a:buNone/>
+              <a:defRPr sz="1600" b="0" i="0" kern="1200">
+                <a:solidFill>
+                  <a:schemeClr val="tx1">
+                    <a:tint val="75000"/>
+                  </a:schemeClr>
+                </a:solidFill>
+                <a:latin typeface="+mj-lt"/>
+                <a:ea typeface="+mj-ea"/>
+                <a:cs typeface="+mj-cs"/>
+              </a:defRPr>
+            </a:lvl3pPr>
+            <a:lvl4pPr marL="1371600" indent="0" algn="ctr" defTabSz="457200" rtl="0" eaLnBrk="1" latinLnBrk="0" hangingPunct="1">
+              <a:spcBef>
+                <a:spcPts val="1000"/>
+              </a:spcBef>
+              <a:spcAft>
+                <a:spcPts val="0"/>
+              </a:spcAft>
+              <a:buClr>
+                <a:schemeClr val="bg2">
+                  <a:lumMod val="40000"/>
+                  <a:lumOff val="60000"/>
+                </a:schemeClr>
+              </a:buClr>
+              <a:buSzPct val="80000"/>
+              <a:buFont typeface="Wingdings 3" charset="2"/>
+              <a:buNone/>
+              <a:defRPr sz="1400" b="0" i="0" kern="1200">
+                <a:solidFill>
+                  <a:schemeClr val="tx1">
+                    <a:tint val="75000"/>
+                  </a:schemeClr>
+                </a:solidFill>
+                <a:latin typeface="+mj-lt"/>
+                <a:ea typeface="+mj-ea"/>
+                <a:cs typeface="+mj-cs"/>
+              </a:defRPr>
+            </a:lvl4pPr>
+            <a:lvl5pPr marL="1828800" indent="0" algn="ctr" defTabSz="457200" rtl="0" eaLnBrk="1" latinLnBrk="0" hangingPunct="1">
+              <a:spcBef>
+                <a:spcPts val="1000"/>
+              </a:spcBef>
+              <a:spcAft>
+                <a:spcPts val="0"/>
+              </a:spcAft>
+              <a:buClr>
+                <a:schemeClr val="bg2">
+                  <a:lumMod val="40000"/>
+                  <a:lumOff val="60000"/>
+                </a:schemeClr>
+              </a:buClr>
+              <a:buSzPct val="80000"/>
+              <a:buFont typeface="Wingdings 3" charset="2"/>
+              <a:buNone/>
+              <a:defRPr sz="1400" b="0" i="0" kern="1200">
+                <a:solidFill>
+                  <a:schemeClr val="tx1">
+                    <a:tint val="75000"/>
+                  </a:schemeClr>
+                </a:solidFill>
+                <a:latin typeface="+mj-lt"/>
+                <a:ea typeface="+mj-ea"/>
+                <a:cs typeface="+mj-cs"/>
+              </a:defRPr>
+            </a:lvl5pPr>
+            <a:lvl6pPr marL="2286000" indent="0" algn="ctr" defTabSz="457200" rtl="0" eaLnBrk="1" latinLnBrk="0" hangingPunct="1">
+              <a:spcBef>
+                <a:spcPts val="1000"/>
+              </a:spcBef>
+              <a:spcAft>
+                <a:spcPts val="0"/>
+              </a:spcAft>
+              <a:buClr>
+                <a:schemeClr val="bg2">
+                  <a:lumMod val="40000"/>
+                  <a:lumOff val="60000"/>
+                </a:schemeClr>
+              </a:buClr>
+              <a:buSzPct val="80000"/>
+              <a:buFont typeface="Wingdings 3" charset="2"/>
+              <a:buNone/>
+              <a:defRPr sz="1400" b="0" i="0" kern="1200">
+                <a:solidFill>
+                  <a:schemeClr val="tx1">
+                    <a:tint val="75000"/>
+                  </a:schemeClr>
+                </a:solidFill>
+                <a:latin typeface="+mj-lt"/>
+                <a:ea typeface="+mj-ea"/>
+                <a:cs typeface="+mj-cs"/>
+              </a:defRPr>
+            </a:lvl6pPr>
+            <a:lvl7pPr marL="2743200" indent="0" algn="ctr" defTabSz="457200" rtl="0" eaLnBrk="1" latinLnBrk="0" hangingPunct="1">
+              <a:spcBef>
+                <a:spcPts val="1000"/>
+              </a:spcBef>
+              <a:spcAft>
+                <a:spcPts val="0"/>
+              </a:spcAft>
+              <a:buClr>
+                <a:schemeClr val="bg2">
+                  <a:lumMod val="40000"/>
+                  <a:lumOff val="60000"/>
+                </a:schemeClr>
+              </a:buClr>
+              <a:buSzPct val="80000"/>
+              <a:buFont typeface="Wingdings 3" charset="2"/>
+              <a:buNone/>
+              <a:defRPr sz="1400" b="0" i="0" kern="1200">
+                <a:solidFill>
+                  <a:schemeClr val="tx1">
+                    <a:tint val="75000"/>
+                  </a:schemeClr>
+                </a:solidFill>
+                <a:latin typeface="+mj-lt"/>
+                <a:ea typeface="+mj-ea"/>
+                <a:cs typeface="+mj-cs"/>
+              </a:defRPr>
+            </a:lvl7pPr>
+            <a:lvl8pPr marL="3200400" indent="0" algn="ctr" defTabSz="457200" rtl="0" eaLnBrk="1" latinLnBrk="0" hangingPunct="1">
+              <a:spcBef>
+                <a:spcPts val="1000"/>
+              </a:spcBef>
+              <a:spcAft>
+                <a:spcPts val="0"/>
+              </a:spcAft>
+              <a:buClr>
+                <a:schemeClr val="bg2">
+                  <a:lumMod val="40000"/>
+                  <a:lumOff val="60000"/>
+                </a:schemeClr>
+              </a:buClr>
+              <a:buSzPct val="80000"/>
+              <a:buFont typeface="Wingdings 3" charset="2"/>
+              <a:buNone/>
+              <a:defRPr sz="1400" b="0" i="0" kern="1200">
+                <a:solidFill>
+                  <a:schemeClr val="tx1">
+                    <a:tint val="75000"/>
+                  </a:schemeClr>
+                </a:solidFill>
+                <a:latin typeface="+mj-lt"/>
+                <a:ea typeface="+mj-ea"/>
+                <a:cs typeface="+mj-cs"/>
+              </a:defRPr>
+            </a:lvl8pPr>
+            <a:lvl9pPr marL="3657600" indent="0" algn="ctr" defTabSz="457200" rtl="0" eaLnBrk="1" latinLnBrk="0" hangingPunct="1">
+              <a:spcBef>
+                <a:spcPts val="1000"/>
+              </a:spcBef>
+              <a:spcAft>
+                <a:spcPts val="0"/>
+              </a:spcAft>
+              <a:buClr>
+                <a:schemeClr val="bg2">
+                  <a:lumMod val="40000"/>
+                  <a:lumOff val="60000"/>
+                </a:schemeClr>
+              </a:buClr>
+              <a:buSzPct val="80000"/>
+              <a:buFont typeface="Wingdings 3" charset="2"/>
+              <a:buNone/>
+              <a:defRPr sz="1400" b="0" i="0" kern="1200">
+                <a:solidFill>
+                  <a:schemeClr val="tx1">
+                    <a:tint val="75000"/>
+                  </a:schemeClr>
+                </a:solidFill>
+                <a:latin typeface="+mj-lt"/>
+                <a:ea typeface="+mj-ea"/>
+                <a:cs typeface="+mj-cs"/>
+              </a:defRPr>
+            </a:lvl9pPr>
+          </a:lstStyle>
+          <a:p>
+            <a:r>
+              <a:rPr lang="en-US" dirty="0" smtClean="0"/>
+              <a:t>	</a:t>
+            </a:r>
+          </a:p>
+          <a:p>
+            <a:pPr marL="1257300" lvl="2" indent="-342900" algn="l">
+              <a:buFont typeface="Arial" panose="020B0604020202020204" pitchFamily="34" charset="0"/>
+              <a:buChar char="•"/>
+            </a:pPr>
+            <a:endParaRPr lang="en-US" sz="2200" dirty="0" smtClean="0">
+              <a:solidFill>
+                <a:schemeClr val="accent3">
+                  <a:lumMod val="40000"/>
+                  <a:lumOff val="60000"/>
+                </a:schemeClr>
+              </a:solidFill>
+            </a:endParaRPr>
+          </a:p>
+        </p:txBody>
+      </p:sp>
+      <p:sp>
+        <p:nvSpPr>
+          <p:cNvPr id="6" name="Title 1"/>
+          <p:cNvSpPr txBox="1">
+            <a:spLocks/>
+          </p:cNvSpPr>
+          <p:nvPr/>
+        </p:nvSpPr>
+        <p:spPr>
+          <a:xfrm>
+            <a:off x="383811" y="878154"/>
+            <a:ext cx="9912714" cy="1054100"/>
+          </a:xfrm>
+          <a:prstGeom prst="rect">
+            <a:avLst/>
+          </a:prstGeom>
+        </p:spPr>
+        <p:txBody>
+          <a:bodyPr vert="horz" lIns="91440" tIns="45720" rIns="91440" bIns="45720" rtlCol="0" anchor="b">
+            <a:noAutofit/>
+          </a:bodyPr>
+          <a:lstStyle>
+            <a:lvl1pPr algn="l" defTabSz="457200" rtl="0" eaLnBrk="1" latinLnBrk="0" hangingPunct="1">
+              <a:spcBef>
+                <a:spcPct val="0"/>
+              </a:spcBef>
+              <a:buNone/>
+              <a:defRPr sz="7200" b="0" i="0" kern="1200">
+                <a:solidFill>
+                  <a:schemeClr val="tx2"/>
+                </a:solidFill>
+                <a:latin typeface="+mj-lt"/>
+                <a:ea typeface="+mj-ea"/>
+                <a:cs typeface="+mj-cs"/>
+              </a:defRPr>
+            </a:lvl1pPr>
+            <a:lvl2pPr eaLnBrk="1" hangingPunct="1">
+              <a:defRPr>
+                <a:solidFill>
+                  <a:schemeClr val="tx2"/>
+                </a:solidFill>
+              </a:defRPr>
+            </a:lvl2pPr>
+            <a:lvl3pPr eaLnBrk="1" hangingPunct="1">
+              <a:defRPr>
+                <a:solidFill>
+                  <a:schemeClr val="tx2"/>
+                </a:solidFill>
+              </a:defRPr>
+            </a:lvl3pPr>
+            <a:lvl4pPr eaLnBrk="1" hangingPunct="1">
+              <a:defRPr>
+                <a:solidFill>
+                  <a:schemeClr val="tx2"/>
+                </a:solidFill>
+              </a:defRPr>
+            </a:lvl4pPr>
+            <a:lvl5pPr eaLnBrk="1" hangingPunct="1">
+              <a:defRPr>
+                <a:solidFill>
+                  <a:schemeClr val="tx2"/>
+                </a:solidFill>
+              </a:defRPr>
+            </a:lvl5pPr>
+            <a:lvl6pPr eaLnBrk="1" hangingPunct="1">
+              <a:defRPr>
+                <a:solidFill>
+                  <a:schemeClr val="tx2"/>
+                </a:solidFill>
+              </a:defRPr>
+            </a:lvl6pPr>
+            <a:lvl7pPr eaLnBrk="1" hangingPunct="1">
+              <a:defRPr>
+                <a:solidFill>
+                  <a:schemeClr val="tx2"/>
+                </a:solidFill>
+              </a:defRPr>
+            </a:lvl7pPr>
+            <a:lvl8pPr eaLnBrk="1" hangingPunct="1">
+              <a:defRPr>
+                <a:solidFill>
+                  <a:schemeClr val="tx2"/>
+                </a:solidFill>
+              </a:defRPr>
+            </a:lvl8pPr>
+            <a:lvl9pPr eaLnBrk="1" hangingPunct="1">
+              <a:defRPr>
+                <a:solidFill>
+                  <a:schemeClr val="tx2"/>
+                </a:solidFill>
+              </a:defRPr>
+            </a:lvl9pPr>
+          </a:lstStyle>
+          <a:p>
+            <a:r>
+              <a:rPr lang="en-US" sz="5400" dirty="0" err="1" smtClean="0"/>
+              <a:t>NodeJS</a:t>
+            </a:r>
+            <a:r>
+              <a:rPr lang="en-US" sz="5400" dirty="0" smtClean="0"/>
+              <a:t> </a:t>
+            </a:r>
+            <a:r>
+              <a:rPr lang="en-US" sz="5400" dirty="0" smtClean="0"/>
+              <a:t>– </a:t>
+            </a:r>
+            <a:r>
+              <a:rPr lang="en-US" sz="5400" dirty="0" smtClean="0"/>
+              <a:t>Conditional Function Definition (2)</a:t>
+            </a:r>
+            <a:endParaRPr lang="he-IL" sz="4400" dirty="0"/>
+          </a:p>
+        </p:txBody>
+      </p:sp>
+      <p:sp>
+        <p:nvSpPr>
+          <p:cNvPr id="2" name="TextBox 1"/>
+          <p:cNvSpPr txBox="1"/>
+          <p:nvPr/>
+        </p:nvSpPr>
+        <p:spPr>
+          <a:xfrm>
+            <a:off x="393336" y="2973682"/>
+            <a:ext cx="6169389" cy="1938992"/>
+          </a:xfrm>
+          <a:prstGeom prst="rect">
+            <a:avLst/>
+          </a:prstGeom>
+          <a:noFill/>
+        </p:spPr>
+        <p:txBody>
+          <a:bodyPr wrap="square" rtlCol="0">
+            <a:spAutoFit/>
+          </a:bodyPr>
+          <a:lstStyle/>
+          <a:p>
+            <a:pPr marL="342900" indent="-342900">
+              <a:buFont typeface="Arial" panose="020B0604020202020204" pitchFamily="34" charset="0"/>
+              <a:buChar char="•"/>
+            </a:pPr>
+            <a:endParaRPr lang="en-US" sz="2400" dirty="0" smtClean="0"/>
+          </a:p>
+          <a:p>
+            <a:pPr marL="342900" indent="-342900">
+              <a:buFont typeface="Arial" panose="020B0604020202020204" pitchFamily="34" charset="0"/>
+              <a:buChar char="•"/>
+            </a:pPr>
+            <a:r>
+              <a:rPr lang="en-US" sz="2400" dirty="0" err="1" smtClean="0"/>
+              <a:t>NodeJS</a:t>
+            </a:r>
+            <a:r>
+              <a:rPr lang="en-US" sz="2400" dirty="0" smtClean="0"/>
+              <a:t>: prints 5</a:t>
+            </a:r>
+          </a:p>
+          <a:p>
+            <a:pPr marL="342900" indent="-342900">
+              <a:buFont typeface="Arial" panose="020B0604020202020204" pitchFamily="34" charset="0"/>
+              <a:buChar char="•"/>
+            </a:pPr>
+            <a:endParaRPr lang="en-US" sz="2400" dirty="0" smtClean="0"/>
+          </a:p>
+          <a:p>
+            <a:pPr marL="342900" indent="-342900">
+              <a:buFont typeface="Arial" panose="020B0604020202020204" pitchFamily="34" charset="0"/>
+              <a:buChar char="•"/>
+            </a:pPr>
+            <a:r>
+              <a:rPr lang="en-US" sz="2400" dirty="0" smtClean="0"/>
+              <a:t>Other Engines: Error for unrecognized function f</a:t>
+            </a:r>
+            <a:endParaRPr lang="en-US" sz="2400" dirty="0"/>
+          </a:p>
+        </p:txBody>
+      </p:sp>
+      <p:pic>
+        <p:nvPicPr>
+          <p:cNvPr id="3" name="תמונה 2"/>
+          <p:cNvPicPr>
+            <a:picLocks noChangeAspect="1"/>
+          </p:cNvPicPr>
+          <p:nvPr/>
+        </p:nvPicPr>
+        <p:blipFill>
+          <a:blip r:embed="rId3"/>
+          <a:stretch>
+            <a:fillRect/>
+          </a:stretch>
+        </p:blipFill>
+        <p:spPr>
+          <a:xfrm>
+            <a:off x="6672217" y="2964427"/>
+            <a:ext cx="4998717" cy="2411146"/>
+          </a:xfrm>
+          <a:prstGeom prst="rect">
+            <a:avLst/>
+          </a:prstGeom>
+        </p:spPr>
+      </p:pic>
+    </p:spTree>
+    <p:extLst>
+      <p:ext uri="{BB962C8B-B14F-4D97-AF65-F5344CB8AC3E}">
+        <p14:creationId xmlns:p14="http://schemas.microsoft.com/office/powerpoint/2010/main" val="1597283639"/>
+      </p:ext>
+    </p:extLst>
+  </p:cSld>
+  <p:clrMapOvr>
+    <a:masterClrMapping/>
+  </p:clrMapOvr>
+  <p:timing>
+    <p:tnLst>
+      <p:par>
+        <p:cTn id="1" dur="indefinite" restart="never" nodeType="tmRoot"/>
+      </p:par>
+    </p:tnLst>
+  </p:timing>
+</p:sld>
+</file>
+
+<file path=ppt/slides/slide25.xml><?xml version="1.0" encoding="utf-8"?>
+<p:sld xmlns:a="http://schemas.openxmlformats.org/drawingml/2006/main" xmlns:r="http://schemas.openxmlformats.org/officeDocument/2006/relationships" xmlns:p="http://schemas.openxmlformats.org/presentationml/2006/main">
+  <p:cSld>
+    <p:spTree>
+      <p:nvGrpSpPr>
+        <p:cNvPr id="1" name=""/>
+        <p:cNvGrpSpPr/>
+        <p:nvPr/>
+      </p:nvGrpSpPr>
+      <p:grpSpPr>
+        <a:xfrm>
+          <a:off x="0" y="0"/>
+          <a:ext cx="0" cy="0"/>
+          <a:chOff x="0" y="0"/>
+          <a:chExt cx="0" cy="0"/>
+        </a:xfrm>
+      </p:grpSpPr>
+      <p:sp>
+        <p:nvSpPr>
+          <p:cNvPr id="4" name="Subtitle 2"/>
+          <p:cNvSpPr txBox="1">
+            <a:spLocks/>
+          </p:cNvSpPr>
+          <p:nvPr/>
+        </p:nvSpPr>
+        <p:spPr>
+          <a:xfrm>
+            <a:off x="242889" y="1163755"/>
+            <a:ext cx="11118162" cy="4812163"/>
+          </a:xfrm>
+          <a:prstGeom prst="rect">
+            <a:avLst/>
+          </a:prstGeom>
+        </p:spPr>
+        <p:txBody>
+          <a:bodyPr vert="horz" lIns="91440" tIns="45720" rIns="91440" bIns="45720" rtlCol="0" anchor="t">
+            <a:normAutofit/>
+          </a:bodyPr>
+          <a:lstStyle>
+            <a:lvl1pPr marL="0" indent="0" algn="l" defTabSz="457200" rtl="0" eaLnBrk="1" latinLnBrk="0" hangingPunct="1">
+              <a:spcBef>
+                <a:spcPts val="1000"/>
+              </a:spcBef>
+              <a:spcAft>
+                <a:spcPts val="0"/>
+              </a:spcAft>
+              <a:buClr>
+                <a:schemeClr val="bg2">
+                  <a:lumMod val="40000"/>
+                  <a:lumOff val="60000"/>
+                </a:schemeClr>
+              </a:buClr>
+              <a:buSzPct val="80000"/>
+              <a:buFont typeface="Wingdings 3" charset="2"/>
+              <a:buNone/>
+              <a:defRPr sz="2000" b="0" i="0" kern="1200" cap="all">
+                <a:solidFill>
+                  <a:schemeClr val="bg2">
+                    <a:lumMod val="40000"/>
+                    <a:lumOff val="60000"/>
+                  </a:schemeClr>
+                </a:solidFill>
+                <a:latin typeface="+mj-lt"/>
+                <a:ea typeface="+mj-ea"/>
+                <a:cs typeface="+mj-cs"/>
+              </a:defRPr>
+            </a:lvl1pPr>
+            <a:lvl2pPr marL="457200" indent="0" algn="ctr" defTabSz="457200" rtl="0" eaLnBrk="1" latinLnBrk="0" hangingPunct="1">
+              <a:spcBef>
+                <a:spcPts val="1000"/>
+              </a:spcBef>
+              <a:spcAft>
+                <a:spcPts val="0"/>
+              </a:spcAft>
+              <a:buClr>
+                <a:schemeClr val="bg2">
+                  <a:lumMod val="40000"/>
+                  <a:lumOff val="60000"/>
+                </a:schemeClr>
+              </a:buClr>
+              <a:buSzPct val="80000"/>
+              <a:buFont typeface="Wingdings 3" charset="2"/>
+              <a:buNone/>
+              <a:defRPr sz="1800" b="0" i="0" kern="1200">
+                <a:solidFill>
+                  <a:schemeClr val="tx1">
+                    <a:tint val="75000"/>
+                  </a:schemeClr>
+                </a:solidFill>
+                <a:latin typeface="+mj-lt"/>
+                <a:ea typeface="+mj-ea"/>
+                <a:cs typeface="+mj-cs"/>
+              </a:defRPr>
+            </a:lvl2pPr>
+            <a:lvl3pPr marL="914400" indent="0" algn="ctr" defTabSz="457200" rtl="0" eaLnBrk="1" latinLnBrk="0" hangingPunct="1">
+              <a:spcBef>
+                <a:spcPts val="1000"/>
+              </a:spcBef>
+              <a:spcAft>
+                <a:spcPts val="0"/>
+              </a:spcAft>
+              <a:buClr>
+                <a:schemeClr val="bg2">
+                  <a:lumMod val="40000"/>
+                  <a:lumOff val="60000"/>
+                </a:schemeClr>
+              </a:buClr>
+              <a:buSzPct val="80000"/>
+              <a:buFont typeface="Wingdings 3" charset="2"/>
+              <a:buNone/>
+              <a:defRPr sz="1600" b="0" i="0" kern="1200">
+                <a:solidFill>
+                  <a:schemeClr val="tx1">
+                    <a:tint val="75000"/>
+                  </a:schemeClr>
+                </a:solidFill>
+                <a:latin typeface="+mj-lt"/>
+                <a:ea typeface="+mj-ea"/>
+                <a:cs typeface="+mj-cs"/>
+              </a:defRPr>
+            </a:lvl3pPr>
+            <a:lvl4pPr marL="1371600" indent="0" algn="ctr" defTabSz="457200" rtl="0" eaLnBrk="1" latinLnBrk="0" hangingPunct="1">
+              <a:spcBef>
+                <a:spcPts val="1000"/>
+              </a:spcBef>
+              <a:spcAft>
+                <a:spcPts val="0"/>
+              </a:spcAft>
+              <a:buClr>
+                <a:schemeClr val="bg2">
+                  <a:lumMod val="40000"/>
+                  <a:lumOff val="60000"/>
+                </a:schemeClr>
+              </a:buClr>
+              <a:buSzPct val="80000"/>
+              <a:buFont typeface="Wingdings 3" charset="2"/>
+              <a:buNone/>
+              <a:defRPr sz="1400" b="0" i="0" kern="1200">
+                <a:solidFill>
+                  <a:schemeClr val="tx1">
+                    <a:tint val="75000"/>
+                  </a:schemeClr>
+                </a:solidFill>
+                <a:latin typeface="+mj-lt"/>
+                <a:ea typeface="+mj-ea"/>
+                <a:cs typeface="+mj-cs"/>
+              </a:defRPr>
+            </a:lvl4pPr>
+            <a:lvl5pPr marL="1828800" indent="0" algn="ctr" defTabSz="457200" rtl="0" eaLnBrk="1" latinLnBrk="0" hangingPunct="1">
+              <a:spcBef>
+                <a:spcPts val="1000"/>
+              </a:spcBef>
+              <a:spcAft>
+                <a:spcPts val="0"/>
+              </a:spcAft>
+              <a:buClr>
+                <a:schemeClr val="bg2">
+                  <a:lumMod val="40000"/>
+                  <a:lumOff val="60000"/>
+                </a:schemeClr>
+              </a:buClr>
+              <a:buSzPct val="80000"/>
+              <a:buFont typeface="Wingdings 3" charset="2"/>
+              <a:buNone/>
+              <a:defRPr sz="1400" b="0" i="0" kern="1200">
+                <a:solidFill>
+                  <a:schemeClr val="tx1">
+                    <a:tint val="75000"/>
+                  </a:schemeClr>
+                </a:solidFill>
+                <a:latin typeface="+mj-lt"/>
+                <a:ea typeface="+mj-ea"/>
+                <a:cs typeface="+mj-cs"/>
+              </a:defRPr>
+            </a:lvl5pPr>
+            <a:lvl6pPr marL="2286000" indent="0" algn="ctr" defTabSz="457200" rtl="0" eaLnBrk="1" latinLnBrk="0" hangingPunct="1">
+              <a:spcBef>
+                <a:spcPts val="1000"/>
+              </a:spcBef>
+              <a:spcAft>
+                <a:spcPts val="0"/>
+              </a:spcAft>
+              <a:buClr>
+                <a:schemeClr val="bg2">
+                  <a:lumMod val="40000"/>
+                  <a:lumOff val="60000"/>
+                </a:schemeClr>
+              </a:buClr>
+              <a:buSzPct val="80000"/>
+              <a:buFont typeface="Wingdings 3" charset="2"/>
+              <a:buNone/>
+              <a:defRPr sz="1400" b="0" i="0" kern="1200">
+                <a:solidFill>
+                  <a:schemeClr val="tx1">
+                    <a:tint val="75000"/>
+                  </a:schemeClr>
+                </a:solidFill>
+                <a:latin typeface="+mj-lt"/>
+                <a:ea typeface="+mj-ea"/>
+                <a:cs typeface="+mj-cs"/>
+              </a:defRPr>
+            </a:lvl6pPr>
+            <a:lvl7pPr marL="2743200" indent="0" algn="ctr" defTabSz="457200" rtl="0" eaLnBrk="1" latinLnBrk="0" hangingPunct="1">
+              <a:spcBef>
+                <a:spcPts val="1000"/>
+              </a:spcBef>
+              <a:spcAft>
+                <a:spcPts val="0"/>
+              </a:spcAft>
+              <a:buClr>
+                <a:schemeClr val="bg2">
+                  <a:lumMod val="40000"/>
+                  <a:lumOff val="60000"/>
+                </a:schemeClr>
+              </a:buClr>
+              <a:buSzPct val="80000"/>
+              <a:buFont typeface="Wingdings 3" charset="2"/>
+              <a:buNone/>
+              <a:defRPr sz="1400" b="0" i="0" kern="1200">
+                <a:solidFill>
+                  <a:schemeClr val="tx1">
+                    <a:tint val="75000"/>
+                  </a:schemeClr>
+                </a:solidFill>
+                <a:latin typeface="+mj-lt"/>
+                <a:ea typeface="+mj-ea"/>
+                <a:cs typeface="+mj-cs"/>
+              </a:defRPr>
+            </a:lvl7pPr>
+            <a:lvl8pPr marL="3200400" indent="0" algn="ctr" defTabSz="457200" rtl="0" eaLnBrk="1" latinLnBrk="0" hangingPunct="1">
+              <a:spcBef>
+                <a:spcPts val="1000"/>
+              </a:spcBef>
+              <a:spcAft>
+                <a:spcPts val="0"/>
+              </a:spcAft>
+              <a:buClr>
+                <a:schemeClr val="bg2">
+                  <a:lumMod val="40000"/>
+                  <a:lumOff val="60000"/>
+                </a:schemeClr>
+              </a:buClr>
+              <a:buSzPct val="80000"/>
+              <a:buFont typeface="Wingdings 3" charset="2"/>
+              <a:buNone/>
+              <a:defRPr sz="1400" b="0" i="0" kern="1200">
+                <a:solidFill>
+                  <a:schemeClr val="tx1">
+                    <a:tint val="75000"/>
+                  </a:schemeClr>
+                </a:solidFill>
+                <a:latin typeface="+mj-lt"/>
+                <a:ea typeface="+mj-ea"/>
+                <a:cs typeface="+mj-cs"/>
+              </a:defRPr>
+            </a:lvl8pPr>
+            <a:lvl9pPr marL="3657600" indent="0" algn="ctr" defTabSz="457200" rtl="0" eaLnBrk="1" latinLnBrk="0" hangingPunct="1">
+              <a:spcBef>
+                <a:spcPts val="1000"/>
+              </a:spcBef>
+              <a:spcAft>
+                <a:spcPts val="0"/>
+              </a:spcAft>
+              <a:buClr>
+                <a:schemeClr val="bg2">
+                  <a:lumMod val="40000"/>
+                  <a:lumOff val="60000"/>
+                </a:schemeClr>
+              </a:buClr>
+              <a:buSzPct val="80000"/>
+              <a:buFont typeface="Wingdings 3" charset="2"/>
+              <a:buNone/>
+              <a:defRPr sz="1400" b="0" i="0" kern="1200">
+                <a:solidFill>
+                  <a:schemeClr val="tx1">
+                    <a:tint val="75000"/>
+                  </a:schemeClr>
+                </a:solidFill>
+                <a:latin typeface="+mj-lt"/>
+                <a:ea typeface="+mj-ea"/>
+                <a:cs typeface="+mj-cs"/>
+              </a:defRPr>
+            </a:lvl9pPr>
+          </a:lstStyle>
+          <a:p>
+            <a:r>
+              <a:rPr lang="en-US" dirty="0" smtClean="0"/>
+              <a:t>	</a:t>
+            </a:r>
+          </a:p>
+          <a:p>
+            <a:pPr marL="1257300" lvl="2" indent="-342900" algn="l">
+              <a:buFont typeface="Arial" panose="020B0604020202020204" pitchFamily="34" charset="0"/>
+              <a:buChar char="•"/>
+            </a:pPr>
+            <a:endParaRPr lang="en-US" sz="2200" dirty="0" smtClean="0">
+              <a:solidFill>
+                <a:schemeClr val="accent3">
+                  <a:lumMod val="40000"/>
+                  <a:lumOff val="60000"/>
+                </a:schemeClr>
+              </a:solidFill>
+            </a:endParaRPr>
+          </a:p>
+        </p:txBody>
+      </p:sp>
+      <p:sp>
+        <p:nvSpPr>
+          <p:cNvPr id="6" name="Title 1"/>
+          <p:cNvSpPr txBox="1">
+            <a:spLocks/>
+          </p:cNvSpPr>
+          <p:nvPr/>
+        </p:nvSpPr>
+        <p:spPr>
+          <a:xfrm>
+            <a:off x="231410" y="249504"/>
+            <a:ext cx="10169889" cy="1054100"/>
+          </a:xfrm>
+          <a:prstGeom prst="rect">
+            <a:avLst/>
+          </a:prstGeom>
+        </p:spPr>
+        <p:txBody>
+          <a:bodyPr vert="horz" lIns="91440" tIns="45720" rIns="91440" bIns="45720" rtlCol="0" anchor="b">
+            <a:noAutofit/>
+          </a:bodyPr>
+          <a:lstStyle>
+            <a:lvl1pPr algn="l" defTabSz="457200" rtl="0" eaLnBrk="1" latinLnBrk="0" hangingPunct="1">
+              <a:spcBef>
+                <a:spcPct val="0"/>
+              </a:spcBef>
+              <a:buNone/>
+              <a:defRPr sz="7200" b="0" i="0" kern="1200">
+                <a:solidFill>
+                  <a:schemeClr val="tx2"/>
+                </a:solidFill>
+                <a:latin typeface="+mj-lt"/>
+                <a:ea typeface="+mj-ea"/>
+                <a:cs typeface="+mj-cs"/>
+              </a:defRPr>
+            </a:lvl1pPr>
+            <a:lvl2pPr eaLnBrk="1" hangingPunct="1">
+              <a:defRPr>
+                <a:solidFill>
+                  <a:schemeClr val="tx2"/>
+                </a:solidFill>
+              </a:defRPr>
+            </a:lvl2pPr>
+            <a:lvl3pPr eaLnBrk="1" hangingPunct="1">
+              <a:defRPr>
+                <a:solidFill>
+                  <a:schemeClr val="tx2"/>
+                </a:solidFill>
+              </a:defRPr>
+            </a:lvl3pPr>
+            <a:lvl4pPr eaLnBrk="1" hangingPunct="1">
+              <a:defRPr>
+                <a:solidFill>
+                  <a:schemeClr val="tx2"/>
+                </a:solidFill>
+              </a:defRPr>
+            </a:lvl4pPr>
+            <a:lvl5pPr eaLnBrk="1" hangingPunct="1">
+              <a:defRPr>
+                <a:solidFill>
+                  <a:schemeClr val="tx2"/>
+                </a:solidFill>
+              </a:defRPr>
+            </a:lvl5pPr>
+            <a:lvl6pPr eaLnBrk="1" hangingPunct="1">
+              <a:defRPr>
+                <a:solidFill>
+                  <a:schemeClr val="tx2"/>
+                </a:solidFill>
+              </a:defRPr>
+            </a:lvl6pPr>
+            <a:lvl7pPr eaLnBrk="1" hangingPunct="1">
+              <a:defRPr>
+                <a:solidFill>
+                  <a:schemeClr val="tx2"/>
+                </a:solidFill>
+              </a:defRPr>
+            </a:lvl7pPr>
+            <a:lvl8pPr eaLnBrk="1" hangingPunct="1">
+              <a:defRPr>
+                <a:solidFill>
+                  <a:schemeClr val="tx2"/>
+                </a:solidFill>
+              </a:defRPr>
+            </a:lvl8pPr>
+            <a:lvl9pPr eaLnBrk="1" hangingPunct="1">
+              <a:defRPr>
+                <a:solidFill>
+                  <a:schemeClr val="tx2"/>
+                </a:solidFill>
+              </a:defRPr>
+            </a:lvl9pPr>
+          </a:lstStyle>
+          <a:p>
+            <a:r>
+              <a:rPr lang="en-US" sz="5400" dirty="0" smtClean="0"/>
+              <a:t>DynJS – Arrays and Undefined</a:t>
+            </a:r>
+            <a:endParaRPr lang="he-IL" sz="4400" dirty="0"/>
+          </a:p>
+        </p:txBody>
+      </p:sp>
+      <p:pic>
+        <p:nvPicPr>
+          <p:cNvPr id="5" name="תמונה 4"/>
+          <p:cNvPicPr>
+            <a:picLocks noChangeAspect="1"/>
+          </p:cNvPicPr>
+          <p:nvPr/>
+        </p:nvPicPr>
+        <p:blipFill>
+          <a:blip r:embed="rId3"/>
+          <a:stretch>
+            <a:fillRect/>
+          </a:stretch>
+        </p:blipFill>
+        <p:spPr>
+          <a:xfrm>
+            <a:off x="947737" y="1764770"/>
+            <a:ext cx="3135349" cy="906170"/>
+          </a:xfrm>
+          <a:prstGeom prst="rect">
+            <a:avLst/>
+          </a:prstGeom>
+        </p:spPr>
+      </p:pic>
+      <p:sp>
+        <p:nvSpPr>
+          <p:cNvPr id="7" name="חץ ימינה 6"/>
+          <p:cNvSpPr/>
+          <p:nvPr/>
+        </p:nvSpPr>
+        <p:spPr>
+          <a:xfrm>
+            <a:off x="5143500" y="1924050"/>
+            <a:ext cx="904875" cy="581025"/>
+          </a:xfrm>
+          <a:prstGeom prst="rightArrow">
+            <a:avLst/>
+          </a:prstGeom>
+        </p:spPr>
+        <p:style>
+          <a:lnRef idx="2">
+            <a:schemeClr val="accent1">
+              <a:shade val="50000"/>
+            </a:schemeClr>
+          </a:lnRef>
+          <a:fillRef idx="1">
+            <a:schemeClr val="accent1"/>
+          </a:fillRef>
+          <a:effectRef idx="0">
+            <a:schemeClr val="accent1"/>
+          </a:effectRef>
+          <a:fontRef idx="minor">
+            <a:schemeClr val="lt1"/>
+          </a:fontRef>
+        </p:style>
+        <p:txBody>
+          <a:bodyPr rtlCol="1" anchor="ctr"/>
+          <a:lstStyle/>
+          <a:p>
+            <a:pPr algn="ctr"/>
+            <a:endParaRPr lang="he-IL"/>
+          </a:p>
+        </p:txBody>
+      </p:sp>
+      <p:sp>
+        <p:nvSpPr>
+          <p:cNvPr id="8" name="TextBox 7"/>
+          <p:cNvSpPr txBox="1"/>
+          <p:nvPr/>
+        </p:nvSpPr>
+        <p:spPr>
+          <a:xfrm>
+            <a:off x="6627446" y="1858744"/>
+            <a:ext cx="4733605" cy="646331"/>
+          </a:xfrm>
+          <a:prstGeom prst="rect">
+            <a:avLst/>
+          </a:prstGeom>
+          <a:noFill/>
+        </p:spPr>
+        <p:txBody>
+          <a:bodyPr wrap="square" rtlCol="1">
+            <a:spAutoFit/>
+          </a:bodyPr>
+          <a:lstStyle/>
+          <a:p>
+            <a:r>
+              <a:rPr lang="en-US" dirty="0" smtClean="0"/>
+              <a:t>DynJS: 			</a:t>
+            </a:r>
+            <a:r>
+              <a:rPr lang="en-US" dirty="0" err="1" smtClean="0"/>
+              <a:t>arr</a:t>
+            </a:r>
+            <a:r>
+              <a:rPr lang="en-US" dirty="0" smtClean="0"/>
+              <a:t> = [0, 1]</a:t>
+            </a:r>
+          </a:p>
+          <a:p>
+            <a:r>
+              <a:rPr lang="en-US" dirty="0" smtClean="0"/>
+              <a:t>Other Engines: 	</a:t>
+            </a:r>
+            <a:r>
+              <a:rPr lang="en-US" dirty="0" err="1" smtClean="0"/>
+              <a:t>arr</a:t>
+            </a:r>
+            <a:r>
+              <a:rPr lang="en-US" dirty="0" smtClean="0"/>
+              <a:t> = [0, undefined, 1]</a:t>
+            </a:r>
+            <a:endParaRPr lang="he-IL" dirty="0"/>
+          </a:p>
+        </p:txBody>
+      </p:sp>
+      <p:pic>
+        <p:nvPicPr>
+          <p:cNvPr id="11" name="תמונה 10"/>
+          <p:cNvPicPr>
+            <a:picLocks noChangeAspect="1"/>
+          </p:cNvPicPr>
+          <p:nvPr/>
+        </p:nvPicPr>
+        <p:blipFill>
+          <a:blip r:embed="rId4"/>
+          <a:stretch>
+            <a:fillRect/>
+          </a:stretch>
+        </p:blipFill>
+        <p:spPr>
+          <a:xfrm>
+            <a:off x="1800389" y="4978136"/>
+            <a:ext cx="4133686" cy="1458948"/>
+          </a:xfrm>
+          <a:prstGeom prst="rect">
+            <a:avLst/>
+          </a:prstGeom>
+        </p:spPr>
+      </p:pic>
+      <p:pic>
+        <p:nvPicPr>
+          <p:cNvPr id="12" name="תמונה 11"/>
+          <p:cNvPicPr>
+            <a:picLocks noChangeAspect="1"/>
+          </p:cNvPicPr>
+          <p:nvPr/>
+        </p:nvPicPr>
+        <p:blipFill>
+          <a:blip r:embed="rId5">
+            <a:extLst>
+              <a:ext uri="{28A0092B-C50C-407E-A947-70E740481C1C}">
+                <a14:useLocalDpi xmlns:a14="http://schemas.microsoft.com/office/drawing/2010/main" val="0"/>
+              </a:ext>
+            </a:extLst>
+          </a:blip>
+          <a:stretch>
+            <a:fillRect/>
+          </a:stretch>
+        </p:blipFill>
+        <p:spPr>
+          <a:xfrm>
+            <a:off x="6346259" y="4978136"/>
+            <a:ext cx="1711890" cy="1335274"/>
+          </a:xfrm>
+          <a:prstGeom prst="rect">
+            <a:avLst/>
+          </a:prstGeom>
+        </p:spPr>
+      </p:pic>
+      <p:sp>
+        <p:nvSpPr>
+          <p:cNvPr id="13" name="TextBox 12"/>
+          <p:cNvSpPr txBox="1"/>
+          <p:nvPr/>
+        </p:nvSpPr>
+        <p:spPr>
+          <a:xfrm>
+            <a:off x="1800389" y="4193804"/>
+            <a:ext cx="2295525" cy="646331"/>
+          </a:xfrm>
+          <a:prstGeom prst="rect">
+            <a:avLst/>
+          </a:prstGeom>
+          <a:noFill/>
+        </p:spPr>
+        <p:txBody>
+          <a:bodyPr wrap="square" rtlCol="1">
+            <a:spAutoFit/>
+          </a:bodyPr>
+          <a:lstStyle/>
+          <a:p>
+            <a:r>
+              <a:rPr lang="en-US" dirty="0" smtClean="0"/>
+              <a:t>DynJS Source Code (</a:t>
+            </a:r>
+            <a:r>
+              <a:rPr lang="en-US" dirty="0" err="1" smtClean="0"/>
+              <a:t>array.push</a:t>
+            </a:r>
+            <a:r>
+              <a:rPr lang="en-US" dirty="0" smtClean="0"/>
+              <a:t>)</a:t>
+            </a:r>
+            <a:endParaRPr lang="he-IL" dirty="0"/>
+          </a:p>
+        </p:txBody>
+      </p:sp>
+      <p:sp>
+        <p:nvSpPr>
+          <p:cNvPr id="14" name="TextBox 13"/>
+          <p:cNvSpPr txBox="1"/>
+          <p:nvPr/>
+        </p:nvSpPr>
+        <p:spPr>
+          <a:xfrm>
+            <a:off x="9060923" y="5884727"/>
+            <a:ext cx="2931052" cy="646331"/>
+          </a:xfrm>
+          <a:prstGeom prst="rect">
+            <a:avLst/>
+          </a:prstGeom>
+          <a:noFill/>
+        </p:spPr>
+        <p:txBody>
+          <a:bodyPr wrap="square" rtlCol="1">
+            <a:spAutoFit/>
+          </a:bodyPr>
+          <a:lstStyle/>
+          <a:p>
+            <a:r>
+              <a:rPr lang="en-US" dirty="0">
+                <a:hlinkClick r:id="rId6"/>
+              </a:rPr>
+              <a:t>https://github.com/dynjs/dynjs/issues/157</a:t>
+            </a:r>
+            <a:endParaRPr lang="he-IL" dirty="0"/>
+          </a:p>
+        </p:txBody>
+      </p:sp>
+    </p:spTree>
+    <p:extLst>
+      <p:ext uri="{BB962C8B-B14F-4D97-AF65-F5344CB8AC3E}">
+        <p14:creationId xmlns:p14="http://schemas.microsoft.com/office/powerpoint/2010/main" val="2174053315"/>
+      </p:ext>
+    </p:extLst>
+  </p:cSld>
+  <p:clrMapOvr>
+    <a:masterClrMapping/>
+  </p:clrMapOvr>
+  <p:timing>
+    <p:tnLst>
+      <p:par>
+        <p:cTn id="1" dur="indefinite" restart="never" nodeType="tmRoot"/>
+      </p:par>
+    </p:tnLst>
+  </p:timing>
+</p:sld>
+</file>
+
+<file path=ppt/slides/slide26.xml><?xml version="1.0" encoding="utf-8"?>
+<p:sld xmlns:a="http://schemas.openxmlformats.org/drawingml/2006/main" xmlns:r="http://schemas.openxmlformats.org/officeDocument/2006/relationships" xmlns:p="http://schemas.openxmlformats.org/presentationml/2006/main">
+  <p:cSld>
+    <p:spTree>
+      <p:nvGrpSpPr>
+        <p:cNvPr id="1" name=""/>
+        <p:cNvGrpSpPr/>
+        <p:nvPr/>
+      </p:nvGrpSpPr>
+      <p:grpSpPr>
+        <a:xfrm>
+          <a:off x="0" y="0"/>
+          <a:ext cx="0" cy="0"/>
+          <a:chOff x="0" y="0"/>
+          <a:chExt cx="0" cy="0"/>
+        </a:xfrm>
+      </p:grpSpPr>
+      <p:sp>
+        <p:nvSpPr>
+          <p:cNvPr id="4" name="Subtitle 2"/>
+          <p:cNvSpPr txBox="1">
+            <a:spLocks/>
+          </p:cNvSpPr>
+          <p:nvPr/>
+        </p:nvSpPr>
+        <p:spPr>
+          <a:xfrm>
+            <a:off x="242889" y="1163755"/>
+            <a:ext cx="11118162" cy="4812163"/>
+          </a:xfrm>
+          <a:prstGeom prst="rect">
+            <a:avLst/>
+          </a:prstGeom>
+        </p:spPr>
+        <p:txBody>
+          <a:bodyPr vert="horz" lIns="91440" tIns="45720" rIns="91440" bIns="45720" rtlCol="0" anchor="t">
+            <a:normAutofit/>
+          </a:bodyPr>
+          <a:lstStyle>
+            <a:lvl1pPr marL="0" indent="0" algn="l" defTabSz="457200" rtl="0" eaLnBrk="1" latinLnBrk="0" hangingPunct="1">
+              <a:spcBef>
+                <a:spcPts val="1000"/>
+              </a:spcBef>
+              <a:spcAft>
+                <a:spcPts val="0"/>
+              </a:spcAft>
+              <a:buClr>
+                <a:schemeClr val="bg2">
+                  <a:lumMod val="40000"/>
+                  <a:lumOff val="60000"/>
+                </a:schemeClr>
+              </a:buClr>
+              <a:buSzPct val="80000"/>
+              <a:buFont typeface="Wingdings 3" charset="2"/>
+              <a:buNone/>
+              <a:defRPr sz="2000" b="0" i="0" kern="1200" cap="all">
+                <a:solidFill>
+                  <a:schemeClr val="bg2">
+                    <a:lumMod val="40000"/>
+                    <a:lumOff val="60000"/>
+                  </a:schemeClr>
+                </a:solidFill>
+                <a:latin typeface="+mj-lt"/>
+                <a:ea typeface="+mj-ea"/>
+                <a:cs typeface="+mj-cs"/>
+              </a:defRPr>
+            </a:lvl1pPr>
+            <a:lvl2pPr marL="457200" indent="0" algn="ctr" defTabSz="457200" rtl="0" eaLnBrk="1" latinLnBrk="0" hangingPunct="1">
+              <a:spcBef>
+                <a:spcPts val="1000"/>
+              </a:spcBef>
+              <a:spcAft>
+                <a:spcPts val="0"/>
+              </a:spcAft>
+              <a:buClr>
+                <a:schemeClr val="bg2">
+                  <a:lumMod val="40000"/>
+                  <a:lumOff val="60000"/>
+                </a:schemeClr>
+              </a:buClr>
+              <a:buSzPct val="80000"/>
+              <a:buFont typeface="Wingdings 3" charset="2"/>
+              <a:buNone/>
+              <a:defRPr sz="1800" b="0" i="0" kern="1200">
+                <a:solidFill>
+                  <a:schemeClr val="tx1">
+                    <a:tint val="75000"/>
+                  </a:schemeClr>
+                </a:solidFill>
+                <a:latin typeface="+mj-lt"/>
+                <a:ea typeface="+mj-ea"/>
+                <a:cs typeface="+mj-cs"/>
+              </a:defRPr>
+            </a:lvl2pPr>
+            <a:lvl3pPr marL="914400" indent="0" algn="ctr" defTabSz="457200" rtl="0" eaLnBrk="1" latinLnBrk="0" hangingPunct="1">
+              <a:spcBef>
+                <a:spcPts val="1000"/>
+              </a:spcBef>
+              <a:spcAft>
+                <a:spcPts val="0"/>
+              </a:spcAft>
+              <a:buClr>
+                <a:schemeClr val="bg2">
+                  <a:lumMod val="40000"/>
+                  <a:lumOff val="60000"/>
+                </a:schemeClr>
+              </a:buClr>
+              <a:buSzPct val="80000"/>
+              <a:buFont typeface="Wingdings 3" charset="2"/>
+              <a:buNone/>
+              <a:defRPr sz="1600" b="0" i="0" kern="1200">
+                <a:solidFill>
+                  <a:schemeClr val="tx1">
+                    <a:tint val="75000"/>
+                  </a:schemeClr>
+                </a:solidFill>
+                <a:latin typeface="+mj-lt"/>
+                <a:ea typeface="+mj-ea"/>
+                <a:cs typeface="+mj-cs"/>
+              </a:defRPr>
+            </a:lvl3pPr>
+            <a:lvl4pPr marL="1371600" indent="0" algn="ctr" defTabSz="457200" rtl="0" eaLnBrk="1" latinLnBrk="0" hangingPunct="1">
+              <a:spcBef>
+                <a:spcPts val="1000"/>
+              </a:spcBef>
+              <a:spcAft>
+                <a:spcPts val="0"/>
+              </a:spcAft>
+              <a:buClr>
+                <a:schemeClr val="bg2">
+                  <a:lumMod val="40000"/>
+                  <a:lumOff val="60000"/>
+                </a:schemeClr>
+              </a:buClr>
+              <a:buSzPct val="80000"/>
+              <a:buFont typeface="Wingdings 3" charset="2"/>
+              <a:buNone/>
+              <a:defRPr sz="1400" b="0" i="0" kern="1200">
+                <a:solidFill>
+                  <a:schemeClr val="tx1">
+                    <a:tint val="75000"/>
+                  </a:schemeClr>
+                </a:solidFill>
+                <a:latin typeface="+mj-lt"/>
+                <a:ea typeface="+mj-ea"/>
+                <a:cs typeface="+mj-cs"/>
+              </a:defRPr>
+            </a:lvl4pPr>
+            <a:lvl5pPr marL="1828800" indent="0" algn="ctr" defTabSz="457200" rtl="0" eaLnBrk="1" latinLnBrk="0" hangingPunct="1">
+              <a:spcBef>
+                <a:spcPts val="1000"/>
+              </a:spcBef>
+              <a:spcAft>
+                <a:spcPts val="0"/>
+              </a:spcAft>
+              <a:buClr>
+                <a:schemeClr val="bg2">
+                  <a:lumMod val="40000"/>
+                  <a:lumOff val="60000"/>
+                </a:schemeClr>
+              </a:buClr>
+              <a:buSzPct val="80000"/>
+              <a:buFont typeface="Wingdings 3" charset="2"/>
+              <a:buNone/>
+              <a:defRPr sz="1400" b="0" i="0" kern="1200">
+                <a:solidFill>
+                  <a:schemeClr val="tx1">
+                    <a:tint val="75000"/>
+                  </a:schemeClr>
+                </a:solidFill>
+                <a:latin typeface="+mj-lt"/>
+                <a:ea typeface="+mj-ea"/>
+                <a:cs typeface="+mj-cs"/>
+              </a:defRPr>
+            </a:lvl5pPr>
+            <a:lvl6pPr marL="2286000" indent="0" algn="ctr" defTabSz="457200" rtl="0" eaLnBrk="1" latinLnBrk="0" hangingPunct="1">
+              <a:spcBef>
+                <a:spcPts val="1000"/>
+              </a:spcBef>
+              <a:spcAft>
+                <a:spcPts val="0"/>
+              </a:spcAft>
+              <a:buClr>
+                <a:schemeClr val="bg2">
+                  <a:lumMod val="40000"/>
+                  <a:lumOff val="60000"/>
+                </a:schemeClr>
+              </a:buClr>
+              <a:buSzPct val="80000"/>
+              <a:buFont typeface="Wingdings 3" charset="2"/>
+              <a:buNone/>
+              <a:defRPr sz="1400" b="0" i="0" kern="1200">
+                <a:solidFill>
+                  <a:schemeClr val="tx1">
+                    <a:tint val="75000"/>
+                  </a:schemeClr>
+                </a:solidFill>
+                <a:latin typeface="+mj-lt"/>
+                <a:ea typeface="+mj-ea"/>
+                <a:cs typeface="+mj-cs"/>
+              </a:defRPr>
+            </a:lvl6pPr>
+            <a:lvl7pPr marL="2743200" indent="0" algn="ctr" defTabSz="457200" rtl="0" eaLnBrk="1" latinLnBrk="0" hangingPunct="1">
+              <a:spcBef>
+                <a:spcPts val="1000"/>
+              </a:spcBef>
+              <a:spcAft>
+                <a:spcPts val="0"/>
+              </a:spcAft>
+              <a:buClr>
+                <a:schemeClr val="bg2">
+                  <a:lumMod val="40000"/>
+                  <a:lumOff val="60000"/>
+                </a:schemeClr>
+              </a:buClr>
+              <a:buSzPct val="80000"/>
+              <a:buFont typeface="Wingdings 3" charset="2"/>
+              <a:buNone/>
+              <a:defRPr sz="1400" b="0" i="0" kern="1200">
+                <a:solidFill>
+                  <a:schemeClr val="tx1">
+                    <a:tint val="75000"/>
+                  </a:schemeClr>
+                </a:solidFill>
+                <a:latin typeface="+mj-lt"/>
+                <a:ea typeface="+mj-ea"/>
+                <a:cs typeface="+mj-cs"/>
+              </a:defRPr>
+            </a:lvl7pPr>
+            <a:lvl8pPr marL="3200400" indent="0" algn="ctr" defTabSz="457200" rtl="0" eaLnBrk="1" latinLnBrk="0" hangingPunct="1">
+              <a:spcBef>
+                <a:spcPts val="1000"/>
+              </a:spcBef>
+              <a:spcAft>
+                <a:spcPts val="0"/>
+              </a:spcAft>
+              <a:buClr>
+                <a:schemeClr val="bg2">
+                  <a:lumMod val="40000"/>
+                  <a:lumOff val="60000"/>
+                </a:schemeClr>
+              </a:buClr>
+              <a:buSzPct val="80000"/>
+              <a:buFont typeface="Wingdings 3" charset="2"/>
+              <a:buNone/>
+              <a:defRPr sz="1400" b="0" i="0" kern="1200">
+                <a:solidFill>
+                  <a:schemeClr val="tx1">
+                    <a:tint val="75000"/>
+                  </a:schemeClr>
+                </a:solidFill>
+                <a:latin typeface="+mj-lt"/>
+                <a:ea typeface="+mj-ea"/>
+                <a:cs typeface="+mj-cs"/>
+              </a:defRPr>
+            </a:lvl8pPr>
+            <a:lvl9pPr marL="3657600" indent="0" algn="ctr" defTabSz="457200" rtl="0" eaLnBrk="1" latinLnBrk="0" hangingPunct="1">
+              <a:spcBef>
+                <a:spcPts val="1000"/>
+              </a:spcBef>
+              <a:spcAft>
+                <a:spcPts val="0"/>
+              </a:spcAft>
+              <a:buClr>
+                <a:schemeClr val="bg2">
+                  <a:lumMod val="40000"/>
+                  <a:lumOff val="60000"/>
+                </a:schemeClr>
+              </a:buClr>
+              <a:buSzPct val="80000"/>
+              <a:buFont typeface="Wingdings 3" charset="2"/>
+              <a:buNone/>
+              <a:defRPr sz="1400" b="0" i="0" kern="1200">
+                <a:solidFill>
+                  <a:schemeClr val="tx1">
+                    <a:tint val="75000"/>
+                  </a:schemeClr>
+                </a:solidFill>
+                <a:latin typeface="+mj-lt"/>
+                <a:ea typeface="+mj-ea"/>
+                <a:cs typeface="+mj-cs"/>
+              </a:defRPr>
+            </a:lvl9pPr>
+          </a:lstStyle>
+          <a:p>
+            <a:r>
+              <a:rPr lang="en-US" dirty="0" smtClean="0"/>
+              <a:t>	</a:t>
+            </a:r>
+          </a:p>
+          <a:p>
+            <a:pPr marL="1257300" lvl="2" indent="-342900" algn="l">
+              <a:buFont typeface="Arial" panose="020B0604020202020204" pitchFamily="34" charset="0"/>
+              <a:buChar char="•"/>
+            </a:pPr>
+            <a:endParaRPr lang="en-US" sz="2200" dirty="0" smtClean="0">
+              <a:solidFill>
+                <a:schemeClr val="accent3">
+                  <a:lumMod val="40000"/>
+                  <a:lumOff val="60000"/>
+                </a:schemeClr>
+              </a:solidFill>
+            </a:endParaRPr>
+          </a:p>
+        </p:txBody>
+      </p:sp>
+      <p:sp>
+        <p:nvSpPr>
+          <p:cNvPr id="6" name="Title 1"/>
+          <p:cNvSpPr txBox="1">
+            <a:spLocks/>
+          </p:cNvSpPr>
+          <p:nvPr/>
+        </p:nvSpPr>
+        <p:spPr>
+          <a:xfrm>
+            <a:off x="574311" y="401904"/>
+            <a:ext cx="8683989" cy="829150"/>
+          </a:xfrm>
+          <a:prstGeom prst="rect">
+            <a:avLst/>
+          </a:prstGeom>
+        </p:spPr>
+        <p:txBody>
+          <a:bodyPr vert="horz" lIns="91440" tIns="45720" rIns="91440" bIns="45720" rtlCol="0" anchor="b">
+            <a:noAutofit/>
+          </a:bodyPr>
+          <a:lstStyle>
+            <a:lvl1pPr algn="l" defTabSz="457200" rtl="0" eaLnBrk="1" latinLnBrk="0" hangingPunct="1">
+              <a:spcBef>
+                <a:spcPct val="0"/>
+              </a:spcBef>
+              <a:buNone/>
+              <a:defRPr sz="7200" b="0" i="0" kern="1200">
+                <a:solidFill>
+                  <a:schemeClr val="tx2"/>
+                </a:solidFill>
+                <a:latin typeface="+mj-lt"/>
+                <a:ea typeface="+mj-ea"/>
+                <a:cs typeface="+mj-cs"/>
+              </a:defRPr>
+            </a:lvl1pPr>
+            <a:lvl2pPr eaLnBrk="1" hangingPunct="1">
+              <a:defRPr>
+                <a:solidFill>
+                  <a:schemeClr val="tx2"/>
+                </a:solidFill>
+              </a:defRPr>
+            </a:lvl2pPr>
+            <a:lvl3pPr eaLnBrk="1" hangingPunct="1">
+              <a:defRPr>
+                <a:solidFill>
+                  <a:schemeClr val="tx2"/>
+                </a:solidFill>
+              </a:defRPr>
+            </a:lvl3pPr>
+            <a:lvl4pPr eaLnBrk="1" hangingPunct="1">
+              <a:defRPr>
+                <a:solidFill>
+                  <a:schemeClr val="tx2"/>
+                </a:solidFill>
+              </a:defRPr>
+            </a:lvl4pPr>
+            <a:lvl5pPr eaLnBrk="1" hangingPunct="1">
+              <a:defRPr>
+                <a:solidFill>
+                  <a:schemeClr val="tx2"/>
+                </a:solidFill>
+              </a:defRPr>
+            </a:lvl5pPr>
+            <a:lvl6pPr eaLnBrk="1" hangingPunct="1">
+              <a:defRPr>
+                <a:solidFill>
+                  <a:schemeClr val="tx2"/>
+                </a:solidFill>
+              </a:defRPr>
+            </a:lvl6pPr>
+            <a:lvl7pPr eaLnBrk="1" hangingPunct="1">
+              <a:defRPr>
+                <a:solidFill>
+                  <a:schemeClr val="tx2"/>
+                </a:solidFill>
+              </a:defRPr>
+            </a:lvl7pPr>
+            <a:lvl8pPr eaLnBrk="1" hangingPunct="1">
+              <a:defRPr>
+                <a:solidFill>
+                  <a:schemeClr val="tx2"/>
+                </a:solidFill>
+              </a:defRPr>
+            </a:lvl8pPr>
+            <a:lvl9pPr eaLnBrk="1" hangingPunct="1">
+              <a:defRPr>
+                <a:solidFill>
+                  <a:schemeClr val="tx2"/>
+                </a:solidFill>
+              </a:defRPr>
+            </a:lvl9pPr>
+          </a:lstStyle>
+          <a:p>
+            <a:r>
+              <a:rPr lang="en-US" sz="5400" dirty="0" smtClean="0"/>
+              <a:t>More DynJS Bugs</a:t>
+            </a:r>
+            <a:endParaRPr lang="he-IL" sz="4400" dirty="0"/>
+          </a:p>
+        </p:txBody>
+      </p:sp>
+      <mc:AlternateContent xmlns:mc="http://schemas.openxmlformats.org/markup-compatibility/2006">
+        <mc:Choice xmlns:a14="http://schemas.microsoft.com/office/drawing/2010/main" Requires="a14">
+          <p:sp>
+            <p:nvSpPr>
+              <p:cNvPr id="2" name="TextBox 1"/>
+              <p:cNvSpPr txBox="1"/>
+              <p:nvPr/>
+            </p:nvSpPr>
+            <p:spPr>
+              <a:xfrm>
+                <a:off x="574311" y="1163755"/>
+                <a:ext cx="6169389" cy="2029851"/>
+              </a:xfrm>
+              <a:prstGeom prst="rect">
+                <a:avLst/>
+              </a:prstGeom>
+              <a:noFill/>
+            </p:spPr>
+            <p:txBody>
+              <a:bodyPr wrap="square" rtlCol="0">
+                <a:spAutoFit/>
+              </a:bodyPr>
+              <a:lstStyle/>
+              <a:p>
+                <a:pPr marL="342900" indent="-342900">
+                  <a:buFont typeface="Arial" panose="020B0604020202020204" pitchFamily="34" charset="0"/>
+                  <a:buChar char="•"/>
+                </a:pPr>
+                <a:endParaRPr lang="en-US" sz="2400" dirty="0" smtClean="0"/>
+              </a:p>
+              <a:p>
+                <a:pPr marL="342900" indent="-342900">
+                  <a:buFont typeface="Arial" panose="020B0604020202020204" pitchFamily="34" charset="0"/>
+                  <a:buChar char="•"/>
+                </a:pPr>
+                <a:r>
+                  <a:rPr lang="en-US" sz="2400" dirty="0" smtClean="0"/>
+                  <a:t>For all </a:t>
+                </a:r>
+                <a14:m>
+                  <m:oMath xmlns:m="http://schemas.openxmlformats.org/officeDocument/2006/math">
+                    <m:r>
+                      <a:rPr lang="en-US" sz="2400" b="0" i="1" smtClean="0">
+                        <a:latin typeface="Cambria Math" panose="02040503050406030204" pitchFamily="18" charset="0"/>
+                      </a:rPr>
+                      <m:t>𝑥</m:t>
+                    </m:r>
+                    <m:r>
+                      <a:rPr lang="en-US" sz="2400" b="0" i="1" smtClean="0">
+                        <a:latin typeface="Cambria Math" panose="02040503050406030204" pitchFamily="18" charset="0"/>
+                      </a:rPr>
+                      <m:t>∈</m:t>
+                    </m:r>
+                    <m:d>
+                      <m:dPr>
+                        <m:begChr m:val="{"/>
+                        <m:endChr m:val="}"/>
+                        <m:ctrlPr>
+                          <a:rPr lang="en-US" sz="2400" b="0" i="1" smtClean="0">
+                            <a:latin typeface="Cambria Math" panose="02040503050406030204" pitchFamily="18" charset="0"/>
+                          </a:rPr>
+                        </m:ctrlPr>
+                      </m:dPr>
+                      <m:e>
+                        <m:sSup>
+                          <m:sSupPr>
+                            <m:ctrlPr>
+                              <a:rPr lang="en-US" sz="2400" b="0" i="1" smtClean="0">
+                                <a:latin typeface="Cambria Math" panose="02040503050406030204" pitchFamily="18" charset="0"/>
+                              </a:rPr>
+                            </m:ctrlPr>
+                          </m:sSupPr>
+                          <m:e>
+                            <m:r>
+                              <a:rPr lang="en-US" sz="2400" b="0" i="1" smtClean="0">
+                                <a:latin typeface="Cambria Math" panose="02040503050406030204" pitchFamily="18" charset="0"/>
+                              </a:rPr>
+                              <m:t>2</m:t>
+                            </m:r>
+                          </m:e>
+                          <m:sup>
+                            <m:r>
+                              <a:rPr lang="en-US" sz="2400" b="0" i="1" smtClean="0">
+                                <a:latin typeface="Cambria Math" panose="02040503050406030204" pitchFamily="18" charset="0"/>
+                              </a:rPr>
+                              <m:t>𝑛</m:t>
+                            </m:r>
+                          </m:sup>
+                        </m:sSup>
+                        <m:r>
+                          <a:rPr lang="en-US" sz="2400" b="0" i="1" smtClean="0">
+                            <a:latin typeface="Cambria Math" panose="02040503050406030204" pitchFamily="18" charset="0"/>
+                          </a:rPr>
+                          <m:t> :</m:t>
+                        </m:r>
+                        <m:r>
+                          <a:rPr lang="en-US" sz="2400" b="0" i="1" smtClean="0">
+                            <a:latin typeface="Cambria Math" panose="02040503050406030204" pitchFamily="18" charset="0"/>
+                          </a:rPr>
+                          <m:t>𝑛</m:t>
+                        </m:r>
+                        <m:r>
+                          <a:rPr lang="en-US" sz="2400" b="0" i="1" smtClean="0">
+                            <a:latin typeface="Cambria Math" panose="02040503050406030204" pitchFamily="18" charset="0"/>
+                          </a:rPr>
+                          <m:t>∈</m:t>
+                        </m:r>
+                        <m:d>
+                          <m:dPr>
+                            <m:begChr m:val="{"/>
+                            <m:endChr m:val="}"/>
+                            <m:ctrlPr>
+                              <a:rPr lang="en-US" sz="2400" b="0" i="1" smtClean="0">
+                                <a:latin typeface="Cambria Math" panose="02040503050406030204" pitchFamily="18" charset="0"/>
+                              </a:rPr>
+                            </m:ctrlPr>
+                          </m:dPr>
+                          <m:e>
+                            <m:r>
+                              <a:rPr lang="en-US" sz="2400" b="0" i="1" smtClean="0">
+                                <a:latin typeface="Cambria Math" panose="02040503050406030204" pitchFamily="18" charset="0"/>
+                              </a:rPr>
+                              <m:t>32</m:t>
+                            </m:r>
+                            <m:r>
+                              <a:rPr lang="en-US" sz="2400" b="0" i="1" smtClean="0">
+                                <a:latin typeface="Cambria Math" panose="02040503050406030204" pitchFamily="18" charset="0"/>
+                              </a:rPr>
+                              <m:t>, </m:t>
+                            </m:r>
+                            <m:r>
+                              <a:rPr lang="en-US" sz="2400" b="0" i="1" smtClean="0">
+                                <a:latin typeface="Cambria Math" panose="02040503050406030204" pitchFamily="18" charset="0"/>
+                              </a:rPr>
+                              <m:t>33</m:t>
+                            </m:r>
+                            <m:r>
+                              <a:rPr lang="en-US" sz="2400" b="0" i="1" smtClean="0">
+                                <a:latin typeface="Cambria Math" panose="02040503050406030204" pitchFamily="18" charset="0"/>
+                              </a:rPr>
+                              <m:t>,…</m:t>
+                            </m:r>
+                            <m:r>
+                              <a:rPr lang="en-US" sz="2400" b="0" i="1" smtClean="0">
+                                <a:latin typeface="Cambria Math" panose="02040503050406030204" pitchFamily="18" charset="0"/>
+                              </a:rPr>
+                              <m:t>52</m:t>
+                            </m:r>
+                          </m:e>
+                        </m:d>
+                      </m:e>
+                    </m:d>
+                    <m:r>
+                      <a:rPr lang="en-US" sz="2400" b="0" i="1" smtClean="0">
+                        <a:latin typeface="Cambria Math" panose="02040503050406030204" pitchFamily="18" charset="0"/>
+                      </a:rPr>
+                      <m:t> </m:t>
+                    </m:r>
+                  </m:oMath>
+                </a14:m>
+                <a:r>
+                  <a:rPr lang="en-US" sz="2400" b="0" dirty="0" smtClean="0"/>
+                  <a:t>:</a:t>
+                </a:r>
+              </a:p>
+              <a:p>
+                <a:pPr marL="800100" lvl="1" indent="-342900">
+                  <a:buFont typeface="Arial" panose="020B0604020202020204" pitchFamily="34" charset="0"/>
+                  <a:buChar char="•"/>
+                </a:pPr>
+                <a:r>
+                  <a:rPr lang="en-US" sz="2400" dirty="0" smtClean="0"/>
+                  <a:t>DynJS:   </a:t>
+                </a:r>
+                <a14:m>
+                  <m:oMath xmlns:m="http://schemas.openxmlformats.org/officeDocument/2006/math">
+                    <m:r>
+                      <a:rPr lang="en-US" sz="2400" i="1" dirty="0" smtClean="0">
+                        <a:latin typeface="Cambria Math" panose="02040503050406030204" pitchFamily="18" charset="0"/>
+                      </a:rPr>
+                      <m:t>!</m:t>
+                    </m:r>
+                    <m:r>
+                      <a:rPr lang="en-US" sz="2400" i="1" dirty="0" smtClean="0">
+                        <a:latin typeface="Cambria Math" panose="02040503050406030204" pitchFamily="18" charset="0"/>
+                      </a:rPr>
+                      <m:t>𝑥</m:t>
+                    </m:r>
+                    <m:r>
+                      <a:rPr lang="en-US" sz="2400" i="1" dirty="0" smtClean="0">
+                        <a:latin typeface="Cambria Math" panose="02040503050406030204" pitchFamily="18" charset="0"/>
+                      </a:rPr>
+                      <m:t> == </m:t>
+                    </m:r>
+                    <m:r>
+                      <a:rPr lang="en-US" sz="2400" i="1" dirty="0" smtClean="0">
+                        <a:latin typeface="Cambria Math" panose="02040503050406030204" pitchFamily="18" charset="0"/>
+                      </a:rPr>
+                      <m:t>𝑡𝑟𝑢𝑒</m:t>
+                    </m:r>
+                  </m:oMath>
+                </a14:m>
+                <a:endParaRPr lang="en-US" sz="2400" dirty="0" smtClean="0"/>
+              </a:p>
+              <a:p>
+                <a:pPr marL="800100" lvl="1" indent="-342900">
+                  <a:buFont typeface="Arial" panose="020B0604020202020204" pitchFamily="34" charset="0"/>
+                  <a:buChar char="•"/>
+                </a:pPr>
+                <a:r>
+                  <a:rPr lang="en-US" sz="2400" b="0" dirty="0" smtClean="0"/>
+                  <a:t>Others:  </a:t>
+                </a:r>
+                <a14:m>
+                  <m:oMath xmlns:m="http://schemas.openxmlformats.org/officeDocument/2006/math">
+                    <m:r>
+                      <a:rPr lang="en-US" sz="2400" b="0" i="1" smtClean="0">
+                        <a:latin typeface="Cambria Math" panose="02040503050406030204" pitchFamily="18" charset="0"/>
+                      </a:rPr>
+                      <m:t>!</m:t>
+                    </m:r>
+                    <m:r>
+                      <a:rPr lang="en-US" sz="2400" b="0" i="1" smtClean="0">
+                        <a:latin typeface="Cambria Math" panose="02040503050406030204" pitchFamily="18" charset="0"/>
+                      </a:rPr>
+                      <m:t>𝑥</m:t>
+                    </m:r>
+                    <m:r>
+                      <a:rPr lang="en-US" sz="2400" b="0" i="1" smtClean="0">
+                        <a:latin typeface="Cambria Math" panose="02040503050406030204" pitchFamily="18" charset="0"/>
+                      </a:rPr>
+                      <m:t>==</m:t>
+                    </m:r>
+                    <m:r>
+                      <a:rPr lang="en-US" sz="2400" b="0" i="1" smtClean="0">
+                        <a:latin typeface="Cambria Math" panose="02040503050406030204" pitchFamily="18" charset="0"/>
+                      </a:rPr>
+                      <m:t>𝑓𝑎𝑙𝑠𝑒</m:t>
+                    </m:r>
+                  </m:oMath>
+                </a14:m>
+                <a:endParaRPr lang="en-US" sz="2400" b="0" dirty="0" smtClean="0"/>
+              </a:p>
+              <a:p>
+                <a:pPr marL="342900" indent="-342900">
+                  <a:buFont typeface="Arial" panose="020B0604020202020204" pitchFamily="34" charset="0"/>
+                  <a:buChar char="•"/>
+                </a:pPr>
+                <a:endParaRPr lang="en-US" sz="2400" b="0" dirty="0" smtClean="0"/>
+              </a:p>
+            </p:txBody>
+          </p:sp>
+        </mc:Choice>
+        <mc:Fallback>
+          <p:sp>
+            <p:nvSpPr>
+              <p:cNvPr id="2" name="TextBox 1"/>
+              <p:cNvSpPr txBox="1">
+                <a:spLocks noRot="1" noChangeAspect="1" noMove="1" noResize="1" noEditPoints="1" noAdjustHandles="1" noChangeArrowheads="1" noChangeShapeType="1" noTextEdit="1"/>
+              </p:cNvSpPr>
+              <p:nvPr/>
+            </p:nvSpPr>
+            <p:spPr>
+              <a:xfrm>
+                <a:off x="574311" y="1163755"/>
+                <a:ext cx="6169389" cy="2029851"/>
+              </a:xfrm>
+              <a:prstGeom prst="rect">
+                <a:avLst/>
+              </a:prstGeom>
+              <a:blipFill rotWithShape="0">
+                <a:blip r:embed="rId3"/>
+                <a:stretch>
+                  <a:fillRect l="-1285"/>
+                </a:stretch>
+              </a:blipFill>
+            </p:spPr>
+            <p:txBody>
+              <a:bodyPr/>
+              <a:lstStyle/>
+              <a:p>
+                <a:r>
+                  <a:rPr lang="he-IL">
+                    <a:noFill/>
+                  </a:rPr>
+                  <a:t> </a:t>
+                </a:r>
+              </a:p>
+            </p:txBody>
+          </p:sp>
+        </mc:Fallback>
+      </mc:AlternateContent>
+      <p:sp>
+        <p:nvSpPr>
+          <p:cNvPr id="5" name="מלבן 4"/>
+          <p:cNvSpPr/>
+          <p:nvPr/>
+        </p:nvSpPr>
+        <p:spPr>
+          <a:xfrm>
+            <a:off x="574311" y="2822235"/>
+            <a:ext cx="4025461" cy="369332"/>
+          </a:xfrm>
+          <a:prstGeom prst="rect">
+            <a:avLst/>
+          </a:prstGeom>
+        </p:spPr>
+        <p:txBody>
+          <a:bodyPr wrap="none">
+            <a:spAutoFit/>
+          </a:bodyPr>
+          <a:lstStyle/>
+          <a:p>
+            <a:r>
+              <a:rPr lang="en-US" dirty="0">
+                <a:latin typeface="Times New Roman" panose="02020603050405020304" pitchFamily="18" charset="0"/>
+                <a:ea typeface="Times New Roman" panose="02020603050405020304" pitchFamily="18" charset="0"/>
+                <a:hlinkClick r:id="rId4"/>
+              </a:rPr>
+              <a:t>https://github.com/dynjs/dynjs/issues/156</a:t>
+            </a:r>
+            <a:endParaRPr lang="he-IL" dirty="0"/>
+          </a:p>
+        </p:txBody>
+      </p:sp>
+      <mc:AlternateContent xmlns:mc="http://schemas.openxmlformats.org/markup-compatibility/2006">
+        <mc:Choice xmlns:a14="http://schemas.microsoft.com/office/drawing/2010/main" Requires="a14">
+          <p:sp>
+            <p:nvSpPr>
+              <p:cNvPr id="7" name="TextBox 6"/>
+              <p:cNvSpPr txBox="1"/>
+              <p:nvPr/>
+            </p:nvSpPr>
+            <p:spPr>
+              <a:xfrm>
+                <a:off x="574311" y="3460388"/>
+                <a:ext cx="6102714" cy="1938992"/>
+              </a:xfrm>
+              <a:prstGeom prst="rect">
+                <a:avLst/>
+              </a:prstGeom>
+              <a:noFill/>
+            </p:spPr>
+            <p:txBody>
+              <a:bodyPr wrap="square" rtlCol="0">
+                <a:spAutoFit/>
+              </a:bodyPr>
+              <a:lstStyle/>
+              <a:p>
+                <a:pPr marL="342900" indent="-342900">
+                  <a:buFont typeface="Arial" panose="020B0604020202020204" pitchFamily="34" charset="0"/>
+                  <a:buChar char="•"/>
+                </a:pPr>
+                <a:endParaRPr lang="en-US" sz="2400" dirty="0" smtClean="0"/>
+              </a:p>
+              <a:p>
+                <a:pPr marL="342900" indent="-342900">
+                  <a:buFont typeface="Arial" panose="020B0604020202020204" pitchFamily="34" charset="0"/>
+                  <a:buChar char="•"/>
+                </a:pPr>
+                <a14:m>
+                  <m:oMath xmlns:m="http://schemas.openxmlformats.org/officeDocument/2006/math">
+                    <m:r>
+                      <a:rPr lang="en-US" sz="2400" i="1" dirty="0" smtClean="0">
+                        <a:latin typeface="Cambria Math" panose="02040503050406030204" pitchFamily="18" charset="0"/>
+                      </a:rPr>
+                      <m:t>𝐽𝑆𝑂𝑁</m:t>
+                    </m:r>
+                    <m:r>
+                      <a:rPr lang="en-US" sz="2400" i="1" dirty="0" smtClean="0">
+                        <a:latin typeface="Cambria Math" panose="02040503050406030204" pitchFamily="18" charset="0"/>
+                      </a:rPr>
+                      <m:t>.</m:t>
+                    </m:r>
+                    <m:r>
+                      <a:rPr lang="en-US" sz="2400" i="1" dirty="0" smtClean="0">
+                        <a:latin typeface="Cambria Math" panose="02040503050406030204" pitchFamily="18" charset="0"/>
+                      </a:rPr>
+                      <m:t>𝑠𝑡𝑟𝑖𝑛𝑔𝑖𝑓𝑦</m:t>
+                    </m:r>
+                    <m:r>
+                      <a:rPr lang="en-US" sz="2400" i="1" dirty="0" smtClean="0">
+                        <a:latin typeface="Cambria Math" panose="02040503050406030204" pitchFamily="18" charset="0"/>
+                      </a:rPr>
+                      <m:t>(</m:t>
+                    </m:r>
+                    <m:r>
+                      <a:rPr lang="en-US" sz="2400" i="1" dirty="0" err="1" smtClean="0">
+                        <a:latin typeface="Cambria Math" panose="02040503050406030204" pitchFamily="18" charset="0"/>
+                      </a:rPr>
+                      <m:t>𝑁𝑎𝑁</m:t>
+                    </m:r>
+                    <m:r>
+                      <a:rPr lang="en-US" sz="2400" i="1" dirty="0" smtClean="0">
+                        <a:latin typeface="Cambria Math" panose="02040503050406030204" pitchFamily="18" charset="0"/>
+                      </a:rPr>
+                      <m:t>)</m:t>
+                    </m:r>
+                  </m:oMath>
+                </a14:m>
+                <a:endParaRPr lang="en-US" sz="2400" b="0" dirty="0" smtClean="0"/>
+              </a:p>
+              <a:p>
+                <a:pPr marL="800100" lvl="1" indent="-342900">
+                  <a:buFont typeface="Arial" panose="020B0604020202020204" pitchFamily="34" charset="0"/>
+                  <a:buChar char="•"/>
+                </a:pPr>
+                <a:r>
+                  <a:rPr lang="en-US" sz="2400" dirty="0" smtClean="0"/>
+                  <a:t>DynJS:   </a:t>
+                </a:r>
+                <a14:m>
+                  <m:oMath xmlns:m="http://schemas.openxmlformats.org/officeDocument/2006/math">
+                    <m:r>
+                      <a:rPr lang="en-US" sz="2400" b="0" i="1" dirty="0" smtClean="0">
+                        <a:latin typeface="Cambria Math" panose="02040503050406030204" pitchFamily="18" charset="0"/>
+                      </a:rPr>
+                      <m:t>𝑁𝑎𝑁</m:t>
+                    </m:r>
+                  </m:oMath>
+                </a14:m>
+                <a:endParaRPr lang="en-US" sz="2400" dirty="0" smtClean="0"/>
+              </a:p>
+              <a:p>
+                <a:pPr marL="800100" lvl="1" indent="-342900">
+                  <a:buFont typeface="Arial" panose="020B0604020202020204" pitchFamily="34" charset="0"/>
+                  <a:buChar char="•"/>
+                </a:pPr>
+                <a:r>
+                  <a:rPr lang="en-US" sz="2400" b="0" dirty="0" smtClean="0"/>
+                  <a:t>Others:  </a:t>
+                </a:r>
+                <a14:m>
+                  <m:oMath xmlns:m="http://schemas.openxmlformats.org/officeDocument/2006/math">
+                    <m:r>
+                      <a:rPr lang="en-US" sz="2400" b="0" i="1" smtClean="0">
+                        <a:latin typeface="Cambria Math" panose="02040503050406030204" pitchFamily="18" charset="0"/>
+                      </a:rPr>
+                      <m:t>𝑛𝑢𝑙𝑙</m:t>
+                    </m:r>
+                  </m:oMath>
+                </a14:m>
+                <a:endParaRPr lang="en-US" sz="2400" b="0" dirty="0" smtClean="0"/>
+              </a:p>
+              <a:p>
+                <a:pPr marL="342900" indent="-342900">
+                  <a:buFont typeface="Arial" panose="020B0604020202020204" pitchFamily="34" charset="0"/>
+                  <a:buChar char="•"/>
+                </a:pPr>
+                <a:endParaRPr lang="en-US" sz="2400" b="0" dirty="0" smtClean="0"/>
+              </a:p>
+            </p:txBody>
+          </p:sp>
+        </mc:Choice>
+        <mc:Fallback>
+          <p:sp>
+            <p:nvSpPr>
+              <p:cNvPr id="7" name="TextBox 6"/>
+              <p:cNvSpPr txBox="1">
+                <a:spLocks noRot="1" noChangeAspect="1" noMove="1" noResize="1" noEditPoints="1" noAdjustHandles="1" noChangeArrowheads="1" noChangeShapeType="1" noTextEdit="1"/>
+              </p:cNvSpPr>
+              <p:nvPr/>
+            </p:nvSpPr>
+            <p:spPr>
+              <a:xfrm>
+                <a:off x="574311" y="3460388"/>
+                <a:ext cx="6102714" cy="1938992"/>
+              </a:xfrm>
+              <a:prstGeom prst="rect">
+                <a:avLst/>
+              </a:prstGeom>
+              <a:blipFill rotWithShape="0">
+                <a:blip r:embed="rId5"/>
+                <a:stretch>
+                  <a:fillRect l="-1299"/>
+                </a:stretch>
+              </a:blipFill>
+            </p:spPr>
+            <p:txBody>
+              <a:bodyPr/>
+              <a:lstStyle/>
+              <a:p>
+                <a:r>
+                  <a:rPr lang="he-IL">
+                    <a:noFill/>
+                  </a:rPr>
+                  <a:t> </a:t>
+                </a:r>
+              </a:p>
+            </p:txBody>
+          </p:sp>
+        </mc:Fallback>
+      </mc:AlternateContent>
+      <p:sp>
+        <p:nvSpPr>
+          <p:cNvPr id="8" name="מלבן 7"/>
+          <p:cNvSpPr/>
+          <p:nvPr/>
+        </p:nvSpPr>
+        <p:spPr>
+          <a:xfrm>
+            <a:off x="574311" y="5318317"/>
+            <a:ext cx="4025461" cy="369332"/>
+          </a:xfrm>
+          <a:prstGeom prst="rect">
+            <a:avLst/>
+          </a:prstGeom>
+        </p:spPr>
+        <p:txBody>
+          <a:bodyPr wrap="none">
+            <a:spAutoFit/>
+          </a:bodyPr>
+          <a:lstStyle/>
+          <a:p>
+            <a:r>
+              <a:rPr lang="en-US" dirty="0">
+                <a:latin typeface="Times New Roman" panose="02020603050405020304" pitchFamily="18" charset="0"/>
+                <a:ea typeface="Times New Roman" panose="02020603050405020304" pitchFamily="18" charset="0"/>
+                <a:hlinkClick r:id="rId6"/>
+              </a:rPr>
+              <a:t>https://</a:t>
+            </a:r>
+            <a:r>
+              <a:rPr lang="en-US" dirty="0" smtClean="0">
+                <a:latin typeface="Times New Roman" panose="02020603050405020304" pitchFamily="18" charset="0"/>
+                <a:ea typeface="Times New Roman" panose="02020603050405020304" pitchFamily="18" charset="0"/>
+                <a:hlinkClick r:id="rId6"/>
+              </a:rPr>
+              <a:t>github.com/dynjs/dynjs/issues/158</a:t>
+            </a:r>
+            <a:endParaRPr lang="he-IL" dirty="0"/>
+          </a:p>
+        </p:txBody>
+      </p:sp>
+    </p:spTree>
+    <p:extLst>
+      <p:ext uri="{BB962C8B-B14F-4D97-AF65-F5344CB8AC3E}">
+        <p14:creationId xmlns:p14="http://schemas.microsoft.com/office/powerpoint/2010/main" val="2332300446"/>
       </p:ext>
     </p:extLst>
   </p:cSld>

</xml_diff>